<commit_message>
enhance secure login #1701
</commit_message>
<xml_diff>
--- a/source/Security/images_SecureLoginDemo/materialSecureLoginDemo.pptx
+++ b/source/Security/images_SecureLoginDemo/materialSecureLoginDemo.pptx
@@ -5,7 +5,7 @@
     <p:sldMasterId id="2147483648" r:id="rId1"/>
   </p:sldMasterIdLst>
   <p:notesMasterIdLst>
-    <p:notesMasterId r:id="rId16"/>
+    <p:notesMasterId r:id="rId19"/>
   </p:notesMasterIdLst>
   <p:sldIdLst>
     <p:sldId id="260" r:id="rId2"/>
@@ -22,6 +22,9 @@
     <p:sldId id="268" r:id="rId13"/>
     <p:sldId id="269" r:id="rId14"/>
     <p:sldId id="270" r:id="rId15"/>
+    <p:sldId id="273" r:id="rId16"/>
+    <p:sldId id="274" r:id="rId17"/>
+    <p:sldId id="272" r:id="rId18"/>
   </p:sldIdLst>
   <p:sldSz cx="9144000" cy="6858000" type="screen4x3"/>
   <p:notesSz cx="6858000" cy="9144000"/>
@@ -139,6 +142,9 @@
             <p14:sldId id="268"/>
             <p14:sldId id="269"/>
             <p14:sldId id="270"/>
+            <p14:sldId id="273"/>
+            <p14:sldId id="274"/>
+            <p14:sldId id="272"/>
           </p14:sldIdLst>
         </p14:section>
       </p14:sectionLst>
@@ -229,7 +235,7 @@
           <a:p>
             <a:fld id="{A9A68E77-2A2E-4FA8-B0E0-268D9A1D7CFA}" type="datetimeFigureOut">
               <a:rPr kumimoji="1" lang="ja-JP" altLang="en-US" smtClean="0"/>
-              <a:t>2016/2/19</a:t>
+              <a:t>2016/7/27</a:t>
             </a:fld>
             <a:endParaRPr kumimoji="1" lang="ja-JP" altLang="en-US"/>
           </a:p>
@@ -794,7 +800,7 @@
           <a:p>
             <a:fld id="{582D171D-F42A-48A6-A355-A2482FAD1CE4}" type="datetimeFigureOut">
               <a:rPr kumimoji="1" lang="ja-JP" altLang="en-US" smtClean="0"/>
-              <a:t>2016/2/19</a:t>
+              <a:t>2016/7/27</a:t>
             </a:fld>
             <a:endParaRPr kumimoji="1" lang="ja-JP" altLang="en-US"/>
           </a:p>
@@ -996,7 +1002,7 @@
           <a:p>
             <a:fld id="{582D171D-F42A-48A6-A355-A2482FAD1CE4}" type="datetimeFigureOut">
               <a:rPr kumimoji="1" lang="ja-JP" altLang="en-US" smtClean="0"/>
-              <a:t>2016/2/19</a:t>
+              <a:t>2016/7/27</a:t>
             </a:fld>
             <a:endParaRPr kumimoji="1" lang="ja-JP" altLang="en-US"/>
           </a:p>
@@ -1208,7 +1214,7 @@
           <a:p>
             <a:fld id="{582D171D-F42A-48A6-A355-A2482FAD1CE4}" type="datetimeFigureOut">
               <a:rPr kumimoji="1" lang="ja-JP" altLang="en-US" smtClean="0"/>
-              <a:t>2016/2/19</a:t>
+              <a:t>2016/7/27</a:t>
             </a:fld>
             <a:endParaRPr kumimoji="1" lang="ja-JP" altLang="en-US"/>
           </a:p>
@@ -1410,7 +1416,7 @@
           <a:p>
             <a:fld id="{582D171D-F42A-48A6-A355-A2482FAD1CE4}" type="datetimeFigureOut">
               <a:rPr kumimoji="1" lang="ja-JP" altLang="en-US" smtClean="0"/>
-              <a:t>2016/2/19</a:t>
+              <a:t>2016/7/27</a:t>
             </a:fld>
             <a:endParaRPr kumimoji="1" lang="ja-JP" altLang="en-US"/>
           </a:p>
@@ -1656,7 +1662,7 @@
           <a:p>
             <a:fld id="{582D171D-F42A-48A6-A355-A2482FAD1CE4}" type="datetimeFigureOut">
               <a:rPr kumimoji="1" lang="ja-JP" altLang="en-US" smtClean="0"/>
-              <a:t>2016/2/19</a:t>
+              <a:t>2016/7/27</a:t>
             </a:fld>
             <a:endParaRPr kumimoji="1" lang="ja-JP" altLang="en-US"/>
           </a:p>
@@ -2008,7 +2014,7 @@
           <a:p>
             <a:fld id="{582D171D-F42A-48A6-A355-A2482FAD1CE4}" type="datetimeFigureOut">
               <a:rPr kumimoji="1" lang="ja-JP" altLang="en-US" smtClean="0"/>
-              <a:t>2016/2/19</a:t>
+              <a:t>2016/7/27</a:t>
             </a:fld>
             <a:endParaRPr kumimoji="1" lang="ja-JP" altLang="en-US"/>
           </a:p>
@@ -2494,7 +2500,7 @@
           <a:p>
             <a:fld id="{582D171D-F42A-48A6-A355-A2482FAD1CE4}" type="datetimeFigureOut">
               <a:rPr kumimoji="1" lang="ja-JP" altLang="en-US" smtClean="0"/>
-              <a:t>2016/2/19</a:t>
+              <a:t>2016/7/27</a:t>
             </a:fld>
             <a:endParaRPr kumimoji="1" lang="ja-JP" altLang="en-US"/>
           </a:p>
@@ -2612,7 +2618,7 @@
           <a:p>
             <a:fld id="{582D171D-F42A-48A6-A355-A2482FAD1CE4}" type="datetimeFigureOut">
               <a:rPr kumimoji="1" lang="ja-JP" altLang="en-US" smtClean="0"/>
-              <a:t>2016/2/19</a:t>
+              <a:t>2016/7/27</a:t>
             </a:fld>
             <a:endParaRPr kumimoji="1" lang="ja-JP" altLang="en-US"/>
           </a:p>
@@ -2707,7 +2713,7 @@
           <a:p>
             <a:fld id="{582D171D-F42A-48A6-A355-A2482FAD1CE4}" type="datetimeFigureOut">
               <a:rPr kumimoji="1" lang="ja-JP" altLang="en-US" smtClean="0"/>
-              <a:t>2016/2/19</a:t>
+              <a:t>2016/7/27</a:t>
             </a:fld>
             <a:endParaRPr kumimoji="1" lang="ja-JP" altLang="en-US"/>
           </a:p>
@@ -3016,7 +3022,7 @@
           <a:p>
             <a:fld id="{582D171D-F42A-48A6-A355-A2482FAD1CE4}" type="datetimeFigureOut">
               <a:rPr kumimoji="1" lang="ja-JP" altLang="en-US" smtClean="0"/>
-              <a:t>2016/2/19</a:t>
+              <a:t>2016/7/27</a:t>
             </a:fld>
             <a:endParaRPr kumimoji="1" lang="ja-JP" altLang="en-US"/>
           </a:p>
@@ -3269,7 +3275,7 @@
           <a:p>
             <a:fld id="{582D171D-F42A-48A6-A355-A2482FAD1CE4}" type="datetimeFigureOut">
               <a:rPr kumimoji="1" lang="ja-JP" altLang="en-US" smtClean="0"/>
-              <a:t>2016/2/19</a:t>
+              <a:t>2016/7/27</a:t>
             </a:fld>
             <a:endParaRPr kumimoji="1" lang="ja-JP" altLang="en-US"/>
           </a:p>
@@ -3514,7 +3520,7 @@
           <a:p>
             <a:fld id="{582D171D-F42A-48A6-A355-A2482FAD1CE4}" type="datetimeFigureOut">
               <a:rPr kumimoji="1" lang="ja-JP" altLang="en-US" smtClean="0"/>
-              <a:t>2016/2/19</a:t>
+              <a:t>2016/7/27</a:t>
             </a:fld>
             <a:endParaRPr kumimoji="1" lang="ja-JP" altLang="en-US"/>
           </a:p>
@@ -8220,6 +8226,1542 @@
 </p:sld>
 </file>
 
+<file path=ppt/slides/slide15.xml><?xml version="1.0" encoding="utf-8"?>
+<p:sld xmlns:a="http://schemas.openxmlformats.org/drawingml/2006/main" xmlns:r="http://schemas.openxmlformats.org/officeDocument/2006/relationships" xmlns:p="http://schemas.openxmlformats.org/presentationml/2006/main">
+  <p:cSld>
+    <p:spTree>
+      <p:nvGrpSpPr>
+        <p:cNvPr id="1" name=""/>
+        <p:cNvGrpSpPr/>
+        <p:nvPr/>
+      </p:nvGrpSpPr>
+      <p:grpSpPr>
+        <a:xfrm>
+          <a:off x="0" y="0"/>
+          <a:ext cx="0" cy="0"/>
+          <a:chOff x="0" y="0"/>
+          <a:chExt cx="0" cy="0"/>
+        </a:xfrm>
+      </p:grpSpPr>
+      <p:pic>
+        <p:nvPicPr>
+          <p:cNvPr id="1027" name="Picture 3"/>
+          <p:cNvPicPr>
+            <a:picLocks noChangeAspect="1" noChangeArrowheads="1"/>
+          </p:cNvPicPr>
+          <p:nvPr/>
+        </p:nvPicPr>
+        <p:blipFill>
+          <a:blip r:embed="rId2">
+            <a:extLst>
+              <a:ext uri="{28A0092B-C50C-407E-A947-70E740481C1C}">
+                <a14:useLocalDpi xmlns:a14="http://schemas.microsoft.com/office/drawing/2010/main" val="0"/>
+              </a:ext>
+            </a:extLst>
+          </a:blip>
+          <a:srcRect/>
+          <a:stretch>
+            <a:fillRect/>
+          </a:stretch>
+        </p:blipFill>
+        <p:spPr bwMode="auto">
+          <a:xfrm>
+            <a:off x="2339752" y="1412776"/>
+            <a:ext cx="3819525" cy="904875"/>
+          </a:xfrm>
+          <a:prstGeom prst="rect">
+            <a:avLst/>
+          </a:prstGeom>
+          <a:noFill/>
+          <a:ln>
+            <a:noFill/>
+          </a:ln>
+          <a:extLst>
+            <a:ext uri="{909E8E84-426E-40DD-AFC4-6F175D3DCCD1}">
+              <a14:hiddenFill xmlns:a14="http://schemas.microsoft.com/office/drawing/2010/main">
+                <a:solidFill>
+                  <a:schemeClr val="accent1"/>
+                </a:solidFill>
+              </a14:hiddenFill>
+            </a:ext>
+            <a:ext uri="{91240B29-F687-4F45-9708-019B960494DF}">
+              <a14:hiddenLine xmlns:a14="http://schemas.microsoft.com/office/drawing/2010/main" w="9525">
+                <a:solidFill>
+                  <a:schemeClr val="tx1"/>
+                </a:solidFill>
+                <a:miter lim="800000"/>
+                <a:headEnd/>
+                <a:tailEnd/>
+              </a14:hiddenLine>
+            </a:ext>
+          </a:extLst>
+        </p:spPr>
+      </p:pic>
+      <p:pic>
+        <p:nvPicPr>
+          <p:cNvPr id="1028" name="Picture 4"/>
+          <p:cNvPicPr>
+            <a:picLocks noChangeAspect="1" noChangeArrowheads="1"/>
+          </p:cNvPicPr>
+          <p:nvPr/>
+        </p:nvPicPr>
+        <p:blipFill>
+          <a:blip r:embed="rId3">
+            <a:extLst>
+              <a:ext uri="{28A0092B-C50C-407E-A947-70E740481C1C}">
+                <a14:useLocalDpi xmlns:a14="http://schemas.microsoft.com/office/drawing/2010/main" val="0"/>
+              </a:ext>
+            </a:extLst>
+          </a:blip>
+          <a:srcRect/>
+          <a:stretch>
+            <a:fillRect/>
+          </a:stretch>
+        </p:blipFill>
+        <p:spPr bwMode="auto">
+          <a:xfrm>
+            <a:off x="2411760" y="2980184"/>
+            <a:ext cx="4305300" cy="304800"/>
+          </a:xfrm>
+          <a:prstGeom prst="rect">
+            <a:avLst/>
+          </a:prstGeom>
+          <a:noFill/>
+          <a:ln>
+            <a:noFill/>
+          </a:ln>
+          <a:extLst>
+            <a:ext uri="{909E8E84-426E-40DD-AFC4-6F175D3DCCD1}">
+              <a14:hiddenFill xmlns:a14="http://schemas.microsoft.com/office/drawing/2010/main">
+                <a:solidFill>
+                  <a:schemeClr val="accent1"/>
+                </a:solidFill>
+              </a14:hiddenFill>
+            </a:ext>
+            <a:ext uri="{91240B29-F687-4F45-9708-019B960494DF}">
+              <a14:hiddenLine xmlns:a14="http://schemas.microsoft.com/office/drawing/2010/main" w="9525">
+                <a:solidFill>
+                  <a:schemeClr val="tx1"/>
+                </a:solidFill>
+                <a:miter lim="800000"/>
+                <a:headEnd/>
+                <a:tailEnd/>
+              </a14:hiddenLine>
+            </a:ext>
+          </a:extLst>
+        </p:spPr>
+      </p:pic>
+      <p:sp>
+        <p:nvSpPr>
+          <p:cNvPr id="4" name="テキスト ボックス 3"/>
+          <p:cNvSpPr txBox="1"/>
+          <p:nvPr/>
+        </p:nvSpPr>
+        <p:spPr>
+          <a:xfrm rot="5400000">
+            <a:off x="3984056" y="2474820"/>
+            <a:ext cx="530915" cy="369332"/>
+          </a:xfrm>
+          <a:prstGeom prst="rect">
+            <a:avLst/>
+          </a:prstGeom>
+          <a:noFill/>
+        </p:spPr>
+        <p:txBody>
+          <a:bodyPr wrap="none" rtlCol="0">
+            <a:spAutoFit/>
+          </a:bodyPr>
+          <a:lstStyle/>
+          <a:p>
+            <a:r>
+              <a:rPr kumimoji="1" lang="ja-JP" altLang="en-US" smtClean="0"/>
+              <a:t>・・・</a:t>
+            </a:r>
+            <a:endParaRPr kumimoji="1" lang="ja-JP" altLang="en-US"/>
+          </a:p>
+        </p:txBody>
+      </p:sp>
+      <p:sp>
+        <p:nvSpPr>
+          <p:cNvPr id="9" name="角丸四角形吹き出し 8"/>
+          <p:cNvSpPr/>
+          <p:nvPr/>
+        </p:nvSpPr>
+        <p:spPr>
+          <a:xfrm>
+            <a:off x="4788024" y="2375007"/>
+            <a:ext cx="2592288" cy="405921"/>
+          </a:xfrm>
+          <a:prstGeom prst="wedgeRoundRectCallout">
+            <a:avLst>
+              <a:gd name="adj1" fmla="val -30349"/>
+              <a:gd name="adj2" fmla="val -80430"/>
+              <a:gd name="adj3" fmla="val 16667"/>
+            </a:avLst>
+          </a:prstGeom>
+        </p:spPr>
+        <p:style>
+          <a:lnRef idx="2">
+            <a:schemeClr val="accent6">
+              <a:shade val="50000"/>
+            </a:schemeClr>
+          </a:lnRef>
+          <a:fillRef idx="1">
+            <a:schemeClr val="accent6"/>
+          </a:fillRef>
+          <a:effectRef idx="0">
+            <a:schemeClr val="accent6"/>
+          </a:effectRef>
+          <a:fontRef idx="minor">
+            <a:schemeClr val="lt1"/>
+          </a:fontRef>
+        </p:style>
+        <p:txBody>
+          <a:bodyPr rtlCol="0" anchor="ctr"/>
+          <a:lstStyle/>
+          <a:p>
+            <a:pPr algn="ctr"/>
+            <a:r>
+              <a:rPr kumimoji="1" lang="en-US" altLang="ja-JP" smtClean="0"/>
+              <a:t>prohibited character</a:t>
+            </a:r>
+            <a:endParaRPr kumimoji="1" lang="ja-JP" altLang="en-US"/>
+          </a:p>
+        </p:txBody>
+      </p:sp>
+      <p:sp>
+        <p:nvSpPr>
+          <p:cNvPr id="10" name="角丸四角形吹き出し 9"/>
+          <p:cNvSpPr/>
+          <p:nvPr/>
+        </p:nvSpPr>
+        <p:spPr>
+          <a:xfrm>
+            <a:off x="4788024" y="2375006"/>
+            <a:ext cx="2592288" cy="405921"/>
+          </a:xfrm>
+          <a:prstGeom prst="wedgeRoundRectCallout">
+            <a:avLst>
+              <a:gd name="adj1" fmla="val -35388"/>
+              <a:gd name="adj2" fmla="val 90530"/>
+              <a:gd name="adj3" fmla="val 16667"/>
+            </a:avLst>
+          </a:prstGeom>
+        </p:spPr>
+        <p:style>
+          <a:lnRef idx="2">
+            <a:schemeClr val="accent6">
+              <a:shade val="50000"/>
+            </a:schemeClr>
+          </a:lnRef>
+          <a:fillRef idx="1">
+            <a:schemeClr val="accent6"/>
+          </a:fillRef>
+          <a:effectRef idx="0">
+            <a:schemeClr val="accent6"/>
+          </a:effectRef>
+          <a:fontRef idx="minor">
+            <a:schemeClr val="lt1"/>
+          </a:fontRef>
+        </p:style>
+        <p:txBody>
+          <a:bodyPr rtlCol="0" anchor="ctr"/>
+          <a:lstStyle/>
+          <a:p>
+            <a:pPr algn="ctr"/>
+            <a:r>
+              <a:rPr kumimoji="1" lang="en-US" altLang="ja-JP" smtClean="0"/>
+              <a:t>prohibited character</a:t>
+            </a:r>
+            <a:endParaRPr kumimoji="1" lang="ja-JP" altLang="en-US"/>
+          </a:p>
+        </p:txBody>
+      </p:sp>
+      <p:sp>
+        <p:nvSpPr>
+          <p:cNvPr id="11" name="下矢印 10"/>
+          <p:cNvSpPr/>
+          <p:nvPr/>
+        </p:nvSpPr>
+        <p:spPr>
+          <a:xfrm>
+            <a:off x="3889473" y="3501008"/>
+            <a:ext cx="720080" cy="561642"/>
+          </a:xfrm>
+          <a:prstGeom prst="downArrow">
+            <a:avLst/>
+          </a:prstGeom>
+        </p:spPr>
+        <p:style>
+          <a:lnRef idx="2">
+            <a:schemeClr val="accent1">
+              <a:shade val="50000"/>
+            </a:schemeClr>
+          </a:lnRef>
+          <a:fillRef idx="1">
+            <a:schemeClr val="accent1"/>
+          </a:fillRef>
+          <a:effectRef idx="0">
+            <a:schemeClr val="accent1"/>
+          </a:effectRef>
+          <a:fontRef idx="minor">
+            <a:schemeClr val="lt1"/>
+          </a:fontRef>
+        </p:style>
+        <p:txBody>
+          <a:bodyPr rtlCol="0" anchor="ctr"/>
+          <a:lstStyle/>
+          <a:p>
+            <a:pPr algn="ctr"/>
+            <a:endParaRPr kumimoji="1" lang="ja-JP" altLang="en-US"/>
+          </a:p>
+        </p:txBody>
+      </p:sp>
+      <p:pic>
+        <p:nvPicPr>
+          <p:cNvPr id="1029" name="Picture 5"/>
+          <p:cNvPicPr>
+            <a:picLocks noChangeAspect="1" noChangeArrowheads="1"/>
+          </p:cNvPicPr>
+          <p:nvPr/>
+        </p:nvPicPr>
+        <p:blipFill>
+          <a:blip r:embed="rId4">
+            <a:extLst>
+              <a:ext uri="{28A0092B-C50C-407E-A947-70E740481C1C}">
+                <a14:useLocalDpi xmlns:a14="http://schemas.microsoft.com/office/drawing/2010/main" val="0"/>
+              </a:ext>
+            </a:extLst>
+          </a:blip>
+          <a:srcRect/>
+          <a:stretch>
+            <a:fillRect/>
+          </a:stretch>
+        </p:blipFill>
+        <p:spPr bwMode="auto">
+          <a:xfrm>
+            <a:off x="2549301" y="4149080"/>
+            <a:ext cx="3400425" cy="1066800"/>
+          </a:xfrm>
+          <a:prstGeom prst="rect">
+            <a:avLst/>
+          </a:prstGeom>
+          <a:noFill/>
+          <a:ln>
+            <a:noFill/>
+          </a:ln>
+          <a:extLst>
+            <a:ext uri="{909E8E84-426E-40DD-AFC4-6F175D3DCCD1}">
+              <a14:hiddenFill xmlns:a14="http://schemas.microsoft.com/office/drawing/2010/main">
+                <a:solidFill>
+                  <a:schemeClr val="accent1"/>
+                </a:solidFill>
+              </a14:hiddenFill>
+            </a:ext>
+            <a:ext uri="{91240B29-F687-4F45-9708-019B960494DF}">
+              <a14:hiddenLine xmlns:a14="http://schemas.microsoft.com/office/drawing/2010/main" w="9525">
+                <a:solidFill>
+                  <a:schemeClr val="tx1"/>
+                </a:solidFill>
+                <a:miter lim="800000"/>
+                <a:headEnd/>
+                <a:tailEnd/>
+              </a14:hiddenLine>
+            </a:ext>
+          </a:extLst>
+        </p:spPr>
+      </p:pic>
+      <p:sp>
+        <p:nvSpPr>
+          <p:cNvPr id="14" name="角丸四角形吹き出し 13"/>
+          <p:cNvSpPr/>
+          <p:nvPr/>
+        </p:nvSpPr>
+        <p:spPr>
+          <a:xfrm>
+            <a:off x="5420916" y="3781829"/>
+            <a:ext cx="2592288" cy="405921"/>
+          </a:xfrm>
+          <a:prstGeom prst="wedgeRoundRectCallout">
+            <a:avLst>
+              <a:gd name="adj1" fmla="val -37908"/>
+              <a:gd name="adj2" fmla="val 88519"/>
+              <a:gd name="adj3" fmla="val 16667"/>
+            </a:avLst>
+          </a:prstGeom>
+        </p:spPr>
+        <p:style>
+          <a:lnRef idx="2">
+            <a:schemeClr val="accent6">
+              <a:shade val="50000"/>
+            </a:schemeClr>
+          </a:lnRef>
+          <a:fillRef idx="1">
+            <a:schemeClr val="accent6"/>
+          </a:fillRef>
+          <a:effectRef idx="0">
+            <a:schemeClr val="accent6"/>
+          </a:effectRef>
+          <a:fontRef idx="minor">
+            <a:schemeClr val="lt1"/>
+          </a:fontRef>
+        </p:style>
+        <p:txBody>
+          <a:bodyPr rtlCol="0" anchor="ctr"/>
+          <a:lstStyle/>
+          <a:p>
+            <a:pPr algn="ctr"/>
+            <a:r>
+              <a:rPr kumimoji="1" lang="en-US" altLang="ja-JP" smtClean="0"/>
+              <a:t>go to error page</a:t>
+            </a:r>
+            <a:endParaRPr kumimoji="1" lang="ja-JP" altLang="en-US"/>
+          </a:p>
+        </p:txBody>
+      </p:sp>
+    </p:spTree>
+    <p:extLst>
+      <p:ext uri="{BB962C8B-B14F-4D97-AF65-F5344CB8AC3E}">
+        <p14:creationId xmlns:p14="http://schemas.microsoft.com/office/powerpoint/2010/main" val="2063683493"/>
+      </p:ext>
+    </p:extLst>
+  </p:cSld>
+  <p:clrMapOvr>
+    <a:masterClrMapping/>
+  </p:clrMapOvr>
+</p:sld>
+</file>
+
+<file path=ppt/slides/slide16.xml><?xml version="1.0" encoding="utf-8"?>
+<p:sld xmlns:a="http://schemas.openxmlformats.org/drawingml/2006/main" xmlns:r="http://schemas.openxmlformats.org/officeDocument/2006/relationships" xmlns:p="http://schemas.openxmlformats.org/presentationml/2006/main">
+  <p:cSld>
+    <p:spTree>
+      <p:nvGrpSpPr>
+        <p:cNvPr id="1" name=""/>
+        <p:cNvGrpSpPr/>
+        <p:nvPr/>
+      </p:nvGrpSpPr>
+      <p:grpSpPr>
+        <a:xfrm>
+          <a:off x="0" y="0"/>
+          <a:ext cx="0" cy="0"/>
+          <a:chOff x="0" y="0"/>
+          <a:chExt cx="0" cy="0"/>
+        </a:xfrm>
+      </p:grpSpPr>
+      <p:pic>
+        <p:nvPicPr>
+          <p:cNvPr id="2050" name="Picture 2"/>
+          <p:cNvPicPr>
+            <a:picLocks noChangeAspect="1" noChangeArrowheads="1"/>
+          </p:cNvPicPr>
+          <p:nvPr/>
+        </p:nvPicPr>
+        <p:blipFill>
+          <a:blip r:embed="rId2">
+            <a:extLst>
+              <a:ext uri="{28A0092B-C50C-407E-A947-70E740481C1C}">
+                <a14:useLocalDpi xmlns:a14="http://schemas.microsoft.com/office/drawing/2010/main" val="0"/>
+              </a:ext>
+            </a:extLst>
+          </a:blip>
+          <a:srcRect/>
+          <a:stretch>
+            <a:fillRect/>
+          </a:stretch>
+        </p:blipFill>
+        <p:spPr bwMode="auto">
+          <a:xfrm>
+            <a:off x="2264474" y="260649"/>
+            <a:ext cx="3970078" cy="2594226"/>
+          </a:xfrm>
+          <a:prstGeom prst="rect">
+            <a:avLst/>
+          </a:prstGeom>
+          <a:noFill/>
+          <a:ln>
+            <a:noFill/>
+          </a:ln>
+          <a:extLst>
+            <a:ext uri="{909E8E84-426E-40DD-AFC4-6F175D3DCCD1}">
+              <a14:hiddenFill xmlns:a14="http://schemas.microsoft.com/office/drawing/2010/main">
+                <a:solidFill>
+                  <a:schemeClr val="accent1"/>
+                </a:solidFill>
+              </a14:hiddenFill>
+            </a:ext>
+            <a:ext uri="{91240B29-F687-4F45-9708-019B960494DF}">
+              <a14:hiddenLine xmlns:a14="http://schemas.microsoft.com/office/drawing/2010/main" w="9525">
+                <a:solidFill>
+                  <a:schemeClr val="tx1"/>
+                </a:solidFill>
+                <a:miter lim="800000"/>
+                <a:headEnd/>
+                <a:tailEnd/>
+              </a14:hiddenLine>
+            </a:ext>
+          </a:extLst>
+        </p:spPr>
+      </p:pic>
+      <p:sp>
+        <p:nvSpPr>
+          <p:cNvPr id="5" name="下矢印 4"/>
+          <p:cNvSpPr/>
+          <p:nvPr/>
+        </p:nvSpPr>
+        <p:spPr>
+          <a:xfrm>
+            <a:off x="3889473" y="2981141"/>
+            <a:ext cx="720080" cy="561642"/>
+          </a:xfrm>
+          <a:prstGeom prst="downArrow">
+            <a:avLst/>
+          </a:prstGeom>
+        </p:spPr>
+        <p:style>
+          <a:lnRef idx="2">
+            <a:schemeClr val="accent1">
+              <a:shade val="50000"/>
+            </a:schemeClr>
+          </a:lnRef>
+          <a:fillRef idx="1">
+            <a:schemeClr val="accent1"/>
+          </a:fillRef>
+          <a:effectRef idx="0">
+            <a:schemeClr val="accent1"/>
+          </a:effectRef>
+          <a:fontRef idx="minor">
+            <a:schemeClr val="lt1"/>
+          </a:fontRef>
+        </p:style>
+        <p:txBody>
+          <a:bodyPr rtlCol="0" anchor="ctr"/>
+          <a:lstStyle/>
+          <a:p>
+            <a:pPr algn="ctr"/>
+            <a:endParaRPr kumimoji="1" lang="ja-JP" altLang="en-US"/>
+          </a:p>
+        </p:txBody>
+      </p:sp>
+      <p:pic>
+        <p:nvPicPr>
+          <p:cNvPr id="2051" name="Picture 3"/>
+          <p:cNvPicPr>
+            <a:picLocks noChangeAspect="1" noChangeArrowheads="1"/>
+          </p:cNvPicPr>
+          <p:nvPr/>
+        </p:nvPicPr>
+        <p:blipFill>
+          <a:blip r:embed="rId3">
+            <a:extLst>
+              <a:ext uri="{28A0092B-C50C-407E-A947-70E740481C1C}">
+                <a14:useLocalDpi xmlns:a14="http://schemas.microsoft.com/office/drawing/2010/main" val="0"/>
+              </a:ext>
+            </a:extLst>
+          </a:blip>
+          <a:srcRect/>
+          <a:stretch>
+            <a:fillRect/>
+          </a:stretch>
+        </p:blipFill>
+        <p:spPr bwMode="auto">
+          <a:xfrm>
+            <a:off x="1636208" y="3645024"/>
+            <a:ext cx="5226610" cy="3052275"/>
+          </a:xfrm>
+          <a:prstGeom prst="rect">
+            <a:avLst/>
+          </a:prstGeom>
+          <a:noFill/>
+          <a:ln>
+            <a:noFill/>
+          </a:ln>
+          <a:extLst>
+            <a:ext uri="{909E8E84-426E-40DD-AFC4-6F175D3DCCD1}">
+              <a14:hiddenFill xmlns:a14="http://schemas.microsoft.com/office/drawing/2010/main">
+                <a:solidFill>
+                  <a:schemeClr val="accent1"/>
+                </a:solidFill>
+              </a14:hiddenFill>
+            </a:ext>
+            <a:ext uri="{91240B29-F687-4F45-9708-019B960494DF}">
+              <a14:hiddenLine xmlns:a14="http://schemas.microsoft.com/office/drawing/2010/main" w="9525">
+                <a:solidFill>
+                  <a:schemeClr val="tx1"/>
+                </a:solidFill>
+                <a:miter lim="800000"/>
+                <a:headEnd/>
+                <a:tailEnd/>
+              </a14:hiddenLine>
+            </a:ext>
+          </a:extLst>
+        </p:spPr>
+      </p:pic>
+      <p:sp>
+        <p:nvSpPr>
+          <p:cNvPr id="7" name="角丸四角形吹き出し 6"/>
+          <p:cNvSpPr/>
+          <p:nvPr/>
+        </p:nvSpPr>
+        <p:spPr>
+          <a:xfrm>
+            <a:off x="5775108" y="6212607"/>
+            <a:ext cx="2175420" cy="382638"/>
+          </a:xfrm>
+          <a:prstGeom prst="wedgeRoundRectCallout">
+            <a:avLst>
+              <a:gd name="adj1" fmla="val -31528"/>
+              <a:gd name="adj2" fmla="val -88577"/>
+              <a:gd name="adj3" fmla="val 16667"/>
+            </a:avLst>
+          </a:prstGeom>
+        </p:spPr>
+        <p:style>
+          <a:lnRef idx="2">
+            <a:schemeClr val="accent6">
+              <a:shade val="50000"/>
+            </a:schemeClr>
+          </a:lnRef>
+          <a:fillRef idx="1">
+            <a:schemeClr val="accent6"/>
+          </a:fillRef>
+          <a:effectRef idx="0">
+            <a:schemeClr val="accent6"/>
+          </a:effectRef>
+          <a:fontRef idx="minor">
+            <a:schemeClr val="lt1"/>
+          </a:fontRef>
+        </p:style>
+        <p:txBody>
+          <a:bodyPr rtlCol="0" anchor="ctr"/>
+          <a:lstStyle/>
+          <a:p>
+            <a:pPr algn="ctr"/>
+            <a:r>
+              <a:rPr kumimoji="1" lang="en-US" altLang="ja-JP" smtClean="0"/>
+              <a:t>show messages</a:t>
+            </a:r>
+            <a:endParaRPr kumimoji="1" lang="ja-JP" altLang="en-US"/>
+          </a:p>
+        </p:txBody>
+      </p:sp>
+      <p:sp>
+        <p:nvSpPr>
+          <p:cNvPr id="8" name="角丸四角形吹き出し 7"/>
+          <p:cNvSpPr/>
+          <p:nvPr/>
+        </p:nvSpPr>
+        <p:spPr>
+          <a:xfrm>
+            <a:off x="5896931" y="620688"/>
+            <a:ext cx="2175420" cy="382638"/>
+          </a:xfrm>
+          <a:prstGeom prst="wedgeRoundRectCallout">
+            <a:avLst>
+              <a:gd name="adj1" fmla="val -105837"/>
+              <a:gd name="adj2" fmla="val -97112"/>
+              <a:gd name="adj3" fmla="val 16667"/>
+            </a:avLst>
+          </a:prstGeom>
+        </p:spPr>
+        <p:style>
+          <a:lnRef idx="2">
+            <a:schemeClr val="accent6">
+              <a:shade val="50000"/>
+            </a:schemeClr>
+          </a:lnRef>
+          <a:fillRef idx="1">
+            <a:schemeClr val="accent6"/>
+          </a:fillRef>
+          <a:effectRef idx="0">
+            <a:schemeClr val="accent6"/>
+          </a:effectRef>
+          <a:fontRef idx="minor">
+            <a:schemeClr val="lt1"/>
+          </a:fontRef>
+        </p:style>
+        <p:txBody>
+          <a:bodyPr rtlCol="0" anchor="ctr"/>
+          <a:lstStyle/>
+          <a:p>
+            <a:pPr algn="ctr"/>
+            <a:r>
+              <a:rPr kumimoji="1" lang="en-US" altLang="ja-JP" smtClean="0"/>
+              <a:t>control character</a:t>
+            </a:r>
+            <a:endParaRPr kumimoji="1" lang="ja-JP" altLang="en-US"/>
+          </a:p>
+        </p:txBody>
+      </p:sp>
+      <p:sp>
+        <p:nvSpPr>
+          <p:cNvPr id="9" name="角丸四角形吹き出し 8"/>
+          <p:cNvSpPr/>
+          <p:nvPr/>
+        </p:nvSpPr>
+        <p:spPr>
+          <a:xfrm>
+            <a:off x="5896931" y="1169172"/>
+            <a:ext cx="2175420" cy="382638"/>
+          </a:xfrm>
+          <a:prstGeom prst="wedgeRoundRectCallout">
+            <a:avLst>
+              <a:gd name="adj1" fmla="val -70184"/>
+              <a:gd name="adj2" fmla="val -48037"/>
+              <a:gd name="adj3" fmla="val 16667"/>
+            </a:avLst>
+          </a:prstGeom>
+        </p:spPr>
+        <p:style>
+          <a:lnRef idx="2">
+            <a:schemeClr val="accent6">
+              <a:shade val="50000"/>
+            </a:schemeClr>
+          </a:lnRef>
+          <a:fillRef idx="1">
+            <a:schemeClr val="accent6"/>
+          </a:fillRef>
+          <a:effectRef idx="0">
+            <a:schemeClr val="accent6"/>
+          </a:effectRef>
+          <a:fontRef idx="minor">
+            <a:schemeClr val="lt1"/>
+          </a:fontRef>
+        </p:style>
+        <p:txBody>
+          <a:bodyPr rtlCol="0" anchor="ctr"/>
+          <a:lstStyle/>
+          <a:p>
+            <a:pPr algn="ctr"/>
+            <a:r>
+              <a:rPr kumimoji="1" lang="en-US" altLang="ja-JP" smtClean="0"/>
+              <a:t>invalid domain</a:t>
+            </a:r>
+            <a:endParaRPr kumimoji="1" lang="ja-JP" altLang="en-US"/>
+          </a:p>
+        </p:txBody>
+      </p:sp>
+      <p:sp>
+        <p:nvSpPr>
+          <p:cNvPr id="10" name="角丸四角形吹き出し 9"/>
+          <p:cNvSpPr/>
+          <p:nvPr/>
+        </p:nvSpPr>
+        <p:spPr>
+          <a:xfrm>
+            <a:off x="5896931" y="1175124"/>
+            <a:ext cx="2175420" cy="382638"/>
+          </a:xfrm>
+          <a:prstGeom prst="wedgeRoundRectCallout">
+            <a:avLst>
+              <a:gd name="adj1" fmla="val -70184"/>
+              <a:gd name="adj2" fmla="val 90652"/>
+              <a:gd name="adj3" fmla="val 16667"/>
+            </a:avLst>
+          </a:prstGeom>
+        </p:spPr>
+        <p:style>
+          <a:lnRef idx="2">
+            <a:schemeClr val="accent6">
+              <a:shade val="50000"/>
+            </a:schemeClr>
+          </a:lnRef>
+          <a:fillRef idx="1">
+            <a:schemeClr val="accent6"/>
+          </a:fillRef>
+          <a:effectRef idx="0">
+            <a:schemeClr val="accent6"/>
+          </a:effectRef>
+          <a:fontRef idx="minor">
+            <a:schemeClr val="lt1"/>
+          </a:fontRef>
+        </p:style>
+        <p:txBody>
+          <a:bodyPr rtlCol="0" anchor="ctr"/>
+          <a:lstStyle/>
+          <a:p>
+            <a:pPr algn="ctr"/>
+            <a:r>
+              <a:rPr kumimoji="1" lang="en-US" altLang="ja-JP" smtClean="0"/>
+              <a:t>invalid domain</a:t>
+            </a:r>
+            <a:endParaRPr kumimoji="1" lang="ja-JP" altLang="en-US"/>
+          </a:p>
+        </p:txBody>
+      </p:sp>
+      <p:sp>
+        <p:nvSpPr>
+          <p:cNvPr id="11" name="角丸四角形吹き出し 10"/>
+          <p:cNvSpPr/>
+          <p:nvPr/>
+        </p:nvSpPr>
+        <p:spPr>
+          <a:xfrm>
+            <a:off x="5896931" y="1772816"/>
+            <a:ext cx="2175420" cy="576064"/>
+          </a:xfrm>
+          <a:prstGeom prst="wedgeRoundRectCallout">
+            <a:avLst>
+              <a:gd name="adj1" fmla="val -75439"/>
+              <a:gd name="adj2" fmla="val -9553"/>
+              <a:gd name="adj3" fmla="val 16667"/>
+            </a:avLst>
+          </a:prstGeom>
+        </p:spPr>
+        <p:style>
+          <a:lnRef idx="2">
+            <a:schemeClr val="accent6">
+              <a:shade val="50000"/>
+            </a:schemeClr>
+          </a:lnRef>
+          <a:fillRef idx="1">
+            <a:schemeClr val="accent6"/>
+          </a:fillRef>
+          <a:effectRef idx="0">
+            <a:schemeClr val="accent6"/>
+          </a:effectRef>
+          <a:fontRef idx="minor">
+            <a:schemeClr val="lt1"/>
+          </a:fontRef>
+        </p:style>
+        <p:txBody>
+          <a:bodyPr rtlCol="0" anchor="ctr"/>
+          <a:lstStyle/>
+          <a:p>
+            <a:pPr algn="ctr"/>
+            <a:r>
+              <a:rPr kumimoji="1" lang="en-US" altLang="ja-JP" smtClean="0"/>
+              <a:t>invalid file extension</a:t>
+            </a:r>
+          </a:p>
+          <a:p>
+            <a:pPr algn="ctr"/>
+            <a:r>
+              <a:rPr lang="en-US" altLang="ja-JP" smtClean="0"/>
+              <a:t>invalid file name</a:t>
+            </a:r>
+            <a:endParaRPr kumimoji="1" lang="ja-JP" altLang="en-US"/>
+          </a:p>
+        </p:txBody>
+      </p:sp>
+    </p:spTree>
+    <p:extLst>
+      <p:ext uri="{BB962C8B-B14F-4D97-AF65-F5344CB8AC3E}">
+        <p14:creationId xmlns:p14="http://schemas.microsoft.com/office/powerpoint/2010/main" val="3017062463"/>
+      </p:ext>
+    </p:extLst>
+  </p:cSld>
+  <p:clrMapOvr>
+    <a:masterClrMapping/>
+  </p:clrMapOvr>
+</p:sld>
+</file>
+
+<file path=ppt/slides/slide17.xml><?xml version="1.0" encoding="utf-8"?>
+<p:sld xmlns:a="http://schemas.openxmlformats.org/drawingml/2006/main" xmlns:r="http://schemas.openxmlformats.org/officeDocument/2006/relationships" xmlns:p="http://schemas.openxmlformats.org/presentationml/2006/main">
+  <p:cSld>
+    <p:spTree>
+      <p:nvGrpSpPr>
+        <p:cNvPr id="1" name=""/>
+        <p:cNvGrpSpPr/>
+        <p:nvPr/>
+      </p:nvGrpSpPr>
+      <p:grpSpPr>
+        <a:xfrm>
+          <a:off x="0" y="0"/>
+          <a:ext cx="0" cy="0"/>
+          <a:chOff x="0" y="0"/>
+          <a:chExt cx="0" cy="0"/>
+        </a:xfrm>
+      </p:grpSpPr>
+      <p:cxnSp>
+        <p:nvCxnSpPr>
+          <p:cNvPr id="36" name="直線コネクタ 35"/>
+          <p:cNvCxnSpPr>
+            <a:stCxn id="27" idx="0"/>
+          </p:cNvCxnSpPr>
+          <p:nvPr/>
+        </p:nvCxnSpPr>
+        <p:spPr>
+          <a:xfrm flipV="1">
+            <a:off x="2237571" y="3212976"/>
+            <a:ext cx="1788182" cy="216024"/>
+          </a:xfrm>
+          <a:prstGeom prst="line">
+            <a:avLst/>
+          </a:prstGeom>
+          <a:ln>
+            <a:prstDash val="sysDot"/>
+          </a:ln>
+        </p:spPr>
+        <p:style>
+          <a:lnRef idx="2">
+            <a:schemeClr val="dk1"/>
+          </a:lnRef>
+          <a:fillRef idx="0">
+            <a:schemeClr val="dk1"/>
+          </a:fillRef>
+          <a:effectRef idx="1">
+            <a:schemeClr val="dk1"/>
+          </a:effectRef>
+          <a:fontRef idx="minor">
+            <a:schemeClr val="tx1"/>
+          </a:fontRef>
+        </p:style>
+      </p:cxnSp>
+      <p:sp>
+        <p:nvSpPr>
+          <p:cNvPr id="4" name="正方形/長方形 3"/>
+          <p:cNvSpPr/>
+          <p:nvPr/>
+        </p:nvSpPr>
+        <p:spPr>
+          <a:xfrm>
+            <a:off x="641377" y="2708920"/>
+            <a:ext cx="1656184" cy="504056"/>
+          </a:xfrm>
+          <a:prstGeom prst="rect">
+            <a:avLst/>
+          </a:prstGeom>
+        </p:spPr>
+        <p:style>
+          <a:lnRef idx="2">
+            <a:schemeClr val="accent1">
+              <a:shade val="50000"/>
+            </a:schemeClr>
+          </a:lnRef>
+          <a:fillRef idx="1">
+            <a:schemeClr val="accent1"/>
+          </a:fillRef>
+          <a:effectRef idx="0">
+            <a:schemeClr val="accent1"/>
+          </a:effectRef>
+          <a:fontRef idx="minor">
+            <a:schemeClr val="lt1"/>
+          </a:fontRef>
+        </p:style>
+        <p:txBody>
+          <a:bodyPr rtlCol="0" anchor="ctr"/>
+          <a:lstStyle/>
+          <a:p>
+            <a:pPr algn="ctr"/>
+            <a:r>
+              <a:rPr kumimoji="1" lang="en-US" altLang="ja-JP" smtClean="0"/>
+              <a:t>Controller</a:t>
+            </a:r>
+            <a:endParaRPr kumimoji="1" lang="ja-JP" altLang="en-US"/>
+          </a:p>
+        </p:txBody>
+      </p:sp>
+      <p:sp>
+        <p:nvSpPr>
+          <p:cNvPr id="5" name="正方形/長方形 4"/>
+          <p:cNvSpPr/>
+          <p:nvPr/>
+        </p:nvSpPr>
+        <p:spPr>
+          <a:xfrm>
+            <a:off x="4025753" y="2711929"/>
+            <a:ext cx="1656184" cy="504056"/>
+          </a:xfrm>
+          <a:prstGeom prst="rect">
+            <a:avLst/>
+          </a:prstGeom>
+        </p:spPr>
+        <p:style>
+          <a:lnRef idx="2">
+            <a:schemeClr val="accent1">
+              <a:shade val="50000"/>
+            </a:schemeClr>
+          </a:lnRef>
+          <a:fillRef idx="1">
+            <a:schemeClr val="accent1"/>
+          </a:fillRef>
+          <a:effectRef idx="0">
+            <a:schemeClr val="accent1"/>
+          </a:effectRef>
+          <a:fontRef idx="minor">
+            <a:schemeClr val="lt1"/>
+          </a:fontRef>
+        </p:style>
+        <p:txBody>
+          <a:bodyPr rtlCol="0" anchor="ctr"/>
+          <a:lstStyle/>
+          <a:p>
+            <a:pPr algn="ctr"/>
+            <a:r>
+              <a:rPr kumimoji="1" lang="en-US" altLang="ja-JP" smtClean="0"/>
+              <a:t>SomeService</a:t>
+            </a:r>
+            <a:endParaRPr kumimoji="1" lang="ja-JP" altLang="en-US"/>
+          </a:p>
+        </p:txBody>
+      </p:sp>
+      <p:cxnSp>
+        <p:nvCxnSpPr>
+          <p:cNvPr id="7" name="直線矢印コネクタ 6"/>
+          <p:cNvCxnSpPr/>
+          <p:nvPr/>
+        </p:nvCxnSpPr>
+        <p:spPr>
+          <a:xfrm>
+            <a:off x="2297561" y="2780928"/>
+            <a:ext cx="1728192" cy="0"/>
+          </a:xfrm>
+          <a:prstGeom prst="straightConnector1">
+            <a:avLst/>
+          </a:prstGeom>
+          <a:ln>
+            <a:tailEnd type="arrow"/>
+          </a:ln>
+        </p:spPr>
+        <p:style>
+          <a:lnRef idx="3">
+            <a:schemeClr val="dk1"/>
+          </a:lnRef>
+          <a:fillRef idx="0">
+            <a:schemeClr val="dk1"/>
+          </a:fillRef>
+          <a:effectRef idx="2">
+            <a:schemeClr val="dk1"/>
+          </a:effectRef>
+          <a:fontRef idx="minor">
+            <a:schemeClr val="tx1"/>
+          </a:fontRef>
+        </p:style>
+      </p:cxnSp>
+      <p:cxnSp>
+        <p:nvCxnSpPr>
+          <p:cNvPr id="8" name="直線矢印コネクタ 7"/>
+          <p:cNvCxnSpPr/>
+          <p:nvPr/>
+        </p:nvCxnSpPr>
+        <p:spPr>
+          <a:xfrm flipH="1">
+            <a:off x="2297561" y="3140968"/>
+            <a:ext cx="1728192" cy="0"/>
+          </a:xfrm>
+          <a:prstGeom prst="straightConnector1">
+            <a:avLst/>
+          </a:prstGeom>
+          <a:ln>
+            <a:tailEnd type="arrow"/>
+          </a:ln>
+        </p:spPr>
+        <p:style>
+          <a:lnRef idx="3">
+            <a:schemeClr val="accent2"/>
+          </a:lnRef>
+          <a:fillRef idx="0">
+            <a:schemeClr val="accent2"/>
+          </a:fillRef>
+          <a:effectRef idx="2">
+            <a:schemeClr val="accent2"/>
+          </a:effectRef>
+          <a:fontRef idx="minor">
+            <a:schemeClr val="tx1"/>
+          </a:fontRef>
+        </p:style>
+      </p:cxnSp>
+      <p:sp>
+        <p:nvSpPr>
+          <p:cNvPr id="13" name="正方形/長方形 12"/>
+          <p:cNvSpPr/>
+          <p:nvPr/>
+        </p:nvSpPr>
+        <p:spPr>
+          <a:xfrm>
+            <a:off x="7050089" y="2708920"/>
+            <a:ext cx="1656184" cy="504056"/>
+          </a:xfrm>
+          <a:prstGeom prst="rect">
+            <a:avLst/>
+          </a:prstGeom>
+        </p:spPr>
+        <p:style>
+          <a:lnRef idx="2">
+            <a:schemeClr val="accent1">
+              <a:shade val="50000"/>
+            </a:schemeClr>
+          </a:lnRef>
+          <a:fillRef idx="1">
+            <a:schemeClr val="accent1"/>
+          </a:fillRef>
+          <a:effectRef idx="0">
+            <a:schemeClr val="accent1"/>
+          </a:effectRef>
+          <a:fontRef idx="minor">
+            <a:schemeClr val="lt1"/>
+          </a:fontRef>
+        </p:style>
+        <p:txBody>
+          <a:bodyPr rtlCol="0" anchor="ctr"/>
+          <a:lstStyle/>
+          <a:p>
+            <a:pPr algn="ctr"/>
+            <a:r>
+              <a:rPr kumimoji="1" lang="en-US" altLang="ja-JP" smtClean="0"/>
+              <a:t>AnotherService</a:t>
+            </a:r>
+            <a:endParaRPr kumimoji="1" lang="ja-JP" altLang="en-US"/>
+          </a:p>
+        </p:txBody>
+      </p:sp>
+      <p:cxnSp>
+        <p:nvCxnSpPr>
+          <p:cNvPr id="14" name="直線矢印コネクタ 13"/>
+          <p:cNvCxnSpPr/>
+          <p:nvPr/>
+        </p:nvCxnSpPr>
+        <p:spPr>
+          <a:xfrm>
+            <a:off x="5681937" y="2780928"/>
+            <a:ext cx="1368152" cy="0"/>
+          </a:xfrm>
+          <a:prstGeom prst="straightConnector1">
+            <a:avLst/>
+          </a:prstGeom>
+          <a:ln>
+            <a:tailEnd type="arrow"/>
+          </a:ln>
+        </p:spPr>
+        <p:style>
+          <a:lnRef idx="3">
+            <a:schemeClr val="dk1"/>
+          </a:lnRef>
+          <a:fillRef idx="0">
+            <a:schemeClr val="dk1"/>
+          </a:fillRef>
+          <a:effectRef idx="2">
+            <a:schemeClr val="dk1"/>
+          </a:effectRef>
+          <a:fontRef idx="minor">
+            <a:schemeClr val="tx1"/>
+          </a:fontRef>
+        </p:style>
+      </p:cxnSp>
+      <p:cxnSp>
+        <p:nvCxnSpPr>
+          <p:cNvPr id="17" name="直線矢印コネクタ 16"/>
+          <p:cNvCxnSpPr/>
+          <p:nvPr/>
+        </p:nvCxnSpPr>
+        <p:spPr>
+          <a:xfrm flipH="1">
+            <a:off x="5681937" y="3140968"/>
+            <a:ext cx="1368152" cy="0"/>
+          </a:xfrm>
+          <a:prstGeom prst="straightConnector1">
+            <a:avLst/>
+          </a:prstGeom>
+          <a:ln>
+            <a:tailEnd type="arrow"/>
+          </a:ln>
+        </p:spPr>
+        <p:style>
+          <a:lnRef idx="3">
+            <a:schemeClr val="dk1"/>
+          </a:lnRef>
+          <a:fillRef idx="0">
+            <a:schemeClr val="dk1"/>
+          </a:fillRef>
+          <a:effectRef idx="2">
+            <a:schemeClr val="dk1"/>
+          </a:effectRef>
+          <a:fontRef idx="minor">
+            <a:schemeClr val="tx1"/>
+          </a:fontRef>
+        </p:style>
+      </p:cxnSp>
+      <p:sp>
+        <p:nvSpPr>
+          <p:cNvPr id="24" name="縦巻き 23"/>
+          <p:cNvSpPr/>
+          <p:nvPr/>
+        </p:nvSpPr>
+        <p:spPr>
+          <a:xfrm>
+            <a:off x="425353" y="1236711"/>
+            <a:ext cx="4320480" cy="1080120"/>
+          </a:xfrm>
+          <a:prstGeom prst="verticalScroll">
+            <a:avLst/>
+          </a:prstGeom>
+        </p:spPr>
+        <p:style>
+          <a:lnRef idx="2">
+            <a:schemeClr val="dk1"/>
+          </a:lnRef>
+          <a:fillRef idx="1">
+            <a:schemeClr val="lt1"/>
+          </a:fillRef>
+          <a:effectRef idx="0">
+            <a:schemeClr val="dk1"/>
+          </a:effectRef>
+          <a:fontRef idx="minor">
+            <a:schemeClr val="dk1"/>
+          </a:fontRef>
+        </p:style>
+        <p:txBody>
+          <a:bodyPr rtlCol="0" anchor="ctr"/>
+          <a:lstStyle/>
+          <a:p>
+            <a:pPr algn="ctr"/>
+            <a:r>
+              <a:rPr kumimoji="1" lang="en-US" altLang="ja-JP" smtClean="0"/>
+              <a:t>2016-07-01 13:20:33</a:t>
+            </a:r>
+          </a:p>
+          <a:p>
+            <a:pPr algn="ctr"/>
+            <a:r>
+              <a:rPr lang="en-US" altLang="ja-JP" smtClean="0"/>
+              <a:t>USER: demo</a:t>
+            </a:r>
+          </a:p>
+          <a:p>
+            <a:pPr algn="ctr"/>
+            <a:r>
+              <a:rPr kumimoji="1" lang="en-US" altLang="ja-JP" smtClean="0"/>
+              <a:t>[START SERVICE] SomeService.doX</a:t>
+            </a:r>
+            <a:endParaRPr kumimoji="1" lang="ja-JP" altLang="en-US"/>
+          </a:p>
+        </p:txBody>
+      </p:sp>
+      <p:sp>
+        <p:nvSpPr>
+          <p:cNvPr id="25" name="縦巻き 24"/>
+          <p:cNvSpPr/>
+          <p:nvPr/>
+        </p:nvSpPr>
+        <p:spPr>
+          <a:xfrm>
+            <a:off x="4788024" y="1230372"/>
+            <a:ext cx="4320480" cy="1080120"/>
+          </a:xfrm>
+          <a:prstGeom prst="verticalScroll">
+            <a:avLst/>
+          </a:prstGeom>
+        </p:spPr>
+        <p:style>
+          <a:lnRef idx="2">
+            <a:schemeClr val="dk1"/>
+          </a:lnRef>
+          <a:fillRef idx="1">
+            <a:schemeClr val="lt1"/>
+          </a:fillRef>
+          <a:effectRef idx="0">
+            <a:schemeClr val="dk1"/>
+          </a:effectRef>
+          <a:fontRef idx="minor">
+            <a:schemeClr val="dk1"/>
+          </a:fontRef>
+        </p:style>
+        <p:txBody>
+          <a:bodyPr rtlCol="0" anchor="ctr"/>
+          <a:lstStyle/>
+          <a:p>
+            <a:pPr algn="ctr"/>
+            <a:r>
+              <a:rPr kumimoji="1" lang="en-US" altLang="ja-JP" smtClean="0"/>
+              <a:t>2016-07-01 13:20:34</a:t>
+            </a:r>
+          </a:p>
+          <a:p>
+            <a:pPr algn="ctr"/>
+            <a:r>
+              <a:rPr lang="en-US" altLang="ja-JP" smtClean="0"/>
+              <a:t>USER: demo</a:t>
+            </a:r>
+          </a:p>
+          <a:p>
+            <a:pPr algn="ctr"/>
+            <a:r>
+              <a:rPr kumimoji="1" lang="en-US" altLang="ja-JP" smtClean="0"/>
+              <a:t>[START SERVICE] AnotherService.doY</a:t>
+            </a:r>
+            <a:endParaRPr kumimoji="1" lang="ja-JP" altLang="en-US"/>
+          </a:p>
+        </p:txBody>
+      </p:sp>
+      <p:sp>
+        <p:nvSpPr>
+          <p:cNvPr id="26" name="縦巻き 25"/>
+          <p:cNvSpPr/>
+          <p:nvPr/>
+        </p:nvSpPr>
+        <p:spPr>
+          <a:xfrm>
+            <a:off x="4421797" y="3573016"/>
+            <a:ext cx="4618503" cy="1080120"/>
+          </a:xfrm>
+          <a:prstGeom prst="verticalScroll">
+            <a:avLst/>
+          </a:prstGeom>
+        </p:spPr>
+        <p:style>
+          <a:lnRef idx="2">
+            <a:schemeClr val="dk1"/>
+          </a:lnRef>
+          <a:fillRef idx="1">
+            <a:schemeClr val="lt1"/>
+          </a:fillRef>
+          <a:effectRef idx="0">
+            <a:schemeClr val="dk1"/>
+          </a:effectRef>
+          <a:fontRef idx="minor">
+            <a:schemeClr val="dk1"/>
+          </a:fontRef>
+        </p:style>
+        <p:txBody>
+          <a:bodyPr rtlCol="0" anchor="ctr"/>
+          <a:lstStyle/>
+          <a:p>
+            <a:pPr algn="ctr"/>
+            <a:r>
+              <a:rPr kumimoji="1" lang="en-US" altLang="ja-JP" smtClean="0"/>
+              <a:t>2016-07-01 13:21:10</a:t>
+            </a:r>
+          </a:p>
+          <a:p>
+            <a:pPr algn="ctr"/>
+            <a:r>
+              <a:rPr lang="en-US" altLang="ja-JP" smtClean="0"/>
+              <a:t>USER: demo</a:t>
+            </a:r>
+          </a:p>
+          <a:p>
+            <a:pPr algn="ctr"/>
+            <a:r>
+              <a:rPr kumimoji="1" lang="en-US" altLang="ja-JP" smtClean="0"/>
+              <a:t>[COMPLETE SERVICE] AnotherService.doY</a:t>
+            </a:r>
+            <a:endParaRPr kumimoji="1" lang="ja-JP" altLang="en-US"/>
+          </a:p>
+        </p:txBody>
+      </p:sp>
+      <p:sp>
+        <p:nvSpPr>
+          <p:cNvPr id="27" name="縦巻き 26"/>
+          <p:cNvSpPr/>
+          <p:nvPr/>
+        </p:nvSpPr>
+        <p:spPr>
+          <a:xfrm>
+            <a:off x="77331" y="3429000"/>
+            <a:ext cx="4320480" cy="1368152"/>
+          </a:xfrm>
+          <a:prstGeom prst="verticalScroll">
+            <a:avLst/>
+          </a:prstGeom>
+        </p:spPr>
+        <p:style>
+          <a:lnRef idx="2">
+            <a:schemeClr val="dk1"/>
+          </a:lnRef>
+          <a:fillRef idx="1">
+            <a:schemeClr val="lt1"/>
+          </a:fillRef>
+          <a:effectRef idx="0">
+            <a:schemeClr val="dk1"/>
+          </a:effectRef>
+          <a:fontRef idx="minor">
+            <a:schemeClr val="dk1"/>
+          </a:fontRef>
+        </p:style>
+        <p:txBody>
+          <a:bodyPr rtlCol="0" anchor="ctr"/>
+          <a:lstStyle/>
+          <a:p>
+            <a:pPr algn="ctr"/>
+            <a:r>
+              <a:rPr kumimoji="1" lang="en-US" altLang="ja-JP" smtClean="0"/>
+              <a:t>2016-07-01 13:20:33</a:t>
+            </a:r>
+          </a:p>
+          <a:p>
+            <a:pPr algn="ctr"/>
+            <a:r>
+              <a:rPr lang="en-US" altLang="ja-JP" smtClean="0"/>
+              <a:t>USER: demo</a:t>
+            </a:r>
+          </a:p>
+          <a:p>
+            <a:pPr algn="ctr"/>
+            <a:r>
+              <a:rPr kumimoji="1" lang="en-US" altLang="ja-JP" smtClean="0"/>
+              <a:t>[SERVICE THROWS EXCEPTION] </a:t>
+            </a:r>
+          </a:p>
+          <a:p>
+            <a:pPr algn="ctr"/>
+            <a:r>
+              <a:rPr kumimoji="1" lang="en-US" altLang="ja-JP" smtClean="0"/>
+              <a:t>SomeService.doX</a:t>
+            </a:r>
+            <a:endParaRPr kumimoji="1" lang="ja-JP" altLang="en-US"/>
+          </a:p>
+        </p:txBody>
+      </p:sp>
+      <p:sp>
+        <p:nvSpPr>
+          <p:cNvPr id="28" name="爆発 1 27"/>
+          <p:cNvSpPr/>
+          <p:nvPr/>
+        </p:nvSpPr>
+        <p:spPr>
+          <a:xfrm>
+            <a:off x="3792031" y="2929009"/>
+            <a:ext cx="540060" cy="423917"/>
+          </a:xfrm>
+          <a:prstGeom prst="irregularSeal1">
+            <a:avLst/>
+          </a:prstGeom>
+        </p:spPr>
+        <p:style>
+          <a:lnRef idx="2">
+            <a:schemeClr val="accent2">
+              <a:shade val="50000"/>
+            </a:schemeClr>
+          </a:lnRef>
+          <a:fillRef idx="1">
+            <a:schemeClr val="accent2"/>
+          </a:fillRef>
+          <a:effectRef idx="0">
+            <a:schemeClr val="accent2"/>
+          </a:effectRef>
+          <a:fontRef idx="minor">
+            <a:schemeClr val="lt1"/>
+          </a:fontRef>
+        </p:style>
+        <p:txBody>
+          <a:bodyPr rtlCol="0" anchor="ctr"/>
+          <a:lstStyle/>
+          <a:p>
+            <a:pPr algn="ctr"/>
+            <a:endParaRPr kumimoji="1" lang="ja-JP" altLang="en-US"/>
+          </a:p>
+        </p:txBody>
+      </p:sp>
+      <p:cxnSp>
+        <p:nvCxnSpPr>
+          <p:cNvPr id="30" name="直線コネクタ 29"/>
+          <p:cNvCxnSpPr>
+            <a:stCxn id="24" idx="2"/>
+          </p:cNvCxnSpPr>
+          <p:nvPr/>
+        </p:nvCxnSpPr>
+        <p:spPr>
+          <a:xfrm>
+            <a:off x="2585593" y="2316831"/>
+            <a:ext cx="1512168" cy="392089"/>
+          </a:xfrm>
+          <a:prstGeom prst="line">
+            <a:avLst/>
+          </a:prstGeom>
+          <a:ln>
+            <a:prstDash val="sysDot"/>
+          </a:ln>
+        </p:spPr>
+        <p:style>
+          <a:lnRef idx="2">
+            <a:schemeClr val="dk1"/>
+          </a:lnRef>
+          <a:fillRef idx="0">
+            <a:schemeClr val="dk1"/>
+          </a:fillRef>
+          <a:effectRef idx="1">
+            <a:schemeClr val="dk1"/>
+          </a:effectRef>
+          <a:fontRef idx="minor">
+            <a:schemeClr val="tx1"/>
+          </a:fontRef>
+        </p:style>
+      </p:cxnSp>
+      <p:cxnSp>
+        <p:nvCxnSpPr>
+          <p:cNvPr id="31" name="直線コネクタ 30"/>
+          <p:cNvCxnSpPr>
+            <a:stCxn id="25" idx="2"/>
+          </p:cNvCxnSpPr>
+          <p:nvPr/>
+        </p:nvCxnSpPr>
+        <p:spPr>
+          <a:xfrm>
+            <a:off x="6948264" y="2310492"/>
+            <a:ext cx="173833" cy="398428"/>
+          </a:xfrm>
+          <a:prstGeom prst="line">
+            <a:avLst/>
+          </a:prstGeom>
+          <a:ln>
+            <a:prstDash val="sysDot"/>
+          </a:ln>
+        </p:spPr>
+        <p:style>
+          <a:lnRef idx="2">
+            <a:schemeClr val="dk1"/>
+          </a:lnRef>
+          <a:fillRef idx="0">
+            <a:schemeClr val="dk1"/>
+          </a:fillRef>
+          <a:effectRef idx="1">
+            <a:schemeClr val="dk1"/>
+          </a:effectRef>
+          <a:fontRef idx="minor">
+            <a:schemeClr val="tx1"/>
+          </a:fontRef>
+        </p:style>
+      </p:cxnSp>
+      <p:cxnSp>
+        <p:nvCxnSpPr>
+          <p:cNvPr id="34" name="直線コネクタ 33"/>
+          <p:cNvCxnSpPr>
+            <a:endCxn id="26" idx="0"/>
+          </p:cNvCxnSpPr>
+          <p:nvPr/>
+        </p:nvCxnSpPr>
+        <p:spPr>
+          <a:xfrm flipH="1">
+            <a:off x="6731049" y="3230910"/>
+            <a:ext cx="391048" cy="342106"/>
+          </a:xfrm>
+          <a:prstGeom prst="line">
+            <a:avLst/>
+          </a:prstGeom>
+          <a:ln>
+            <a:prstDash val="sysDot"/>
+          </a:ln>
+        </p:spPr>
+        <p:style>
+          <a:lnRef idx="2">
+            <a:schemeClr val="dk1"/>
+          </a:lnRef>
+          <a:fillRef idx="0">
+            <a:schemeClr val="dk1"/>
+          </a:fillRef>
+          <a:effectRef idx="1">
+            <a:schemeClr val="dk1"/>
+          </a:effectRef>
+          <a:fontRef idx="minor">
+            <a:schemeClr val="tx1"/>
+          </a:fontRef>
+        </p:style>
+      </p:cxnSp>
+    </p:spTree>
+    <p:extLst>
+      <p:ext uri="{BB962C8B-B14F-4D97-AF65-F5344CB8AC3E}">
+        <p14:creationId xmlns:p14="http://schemas.microsoft.com/office/powerpoint/2010/main" val="3179135134"/>
+      </p:ext>
+    </p:extLst>
+  </p:cSld>
+  <p:clrMapOvr>
+    <a:masterClrMapping/>
+  </p:clrMapOvr>
+</p:sld>
+</file>
+
 <file path=ppt/slides/slide2.xml><?xml version="1.0" encoding="utf-8"?>
 <p:sld xmlns:a="http://schemas.openxmlformats.org/drawingml/2006/main" xmlns:r="http://schemas.openxmlformats.org/officeDocument/2006/relationships" xmlns:p="http://schemas.openxmlformats.org/presentationml/2006/main">
   <p:cSld>
@@ -11838,8 +13380,8 @@
         </p:nvSpPr>
         <p:spPr>
           <a:xfrm>
-            <a:off x="545821" y="2723678"/>
-            <a:ext cx="7914611" cy="2880320"/>
+            <a:off x="545821" y="3320988"/>
+            <a:ext cx="7914611" cy="2412268"/>
           </a:xfrm>
           <a:prstGeom prst="rect">
             <a:avLst/>
@@ -11876,7 +13418,7 @@
         </p:nvSpPr>
         <p:spPr>
           <a:xfrm>
-            <a:off x="395536" y="574558"/>
+            <a:off x="287523" y="1438565"/>
             <a:ext cx="1080120" cy="432048"/>
           </a:xfrm>
           <a:prstGeom prst="roundRect">
@@ -11922,7 +13464,7 @@
         </p:nvSpPr>
         <p:spPr>
           <a:xfrm>
-            <a:off x="1259632" y="3155726"/>
+            <a:off x="1259632" y="3573016"/>
             <a:ext cx="1080120" cy="432048"/>
           </a:xfrm>
           <a:prstGeom prst="roundRect">
@@ -11950,7 +13492,7 @@
             <a:pPr algn="ctr"/>
             <a:r>
               <a:rPr lang="en-US" altLang="ja-JP" smtClean="0"/>
-              <a:t>(2) Top</a:t>
+              <a:t>(9) Top</a:t>
             </a:r>
             <a:endParaRPr kumimoji="1" lang="ja-JP" altLang="en-US"/>
           </a:p>
@@ -11964,7 +13506,7 @@
         </p:nvSpPr>
         <p:spPr>
           <a:xfrm>
-            <a:off x="2915816" y="1539540"/>
+            <a:off x="3347864" y="2420236"/>
             <a:ext cx="2304256" cy="432048"/>
           </a:xfrm>
           <a:prstGeom prst="roundRect">
@@ -11992,7 +13534,15 @@
             <a:pPr algn="ctr"/>
             <a:r>
               <a:rPr lang="en-US" altLang="ja-JP" smtClean="0"/>
-              <a:t>(10) Reissue Password</a:t>
+              <a:t>(</a:t>
+            </a:r>
+            <a:r>
+              <a:rPr lang="en-US" altLang="ja-JP"/>
+              <a:t>7</a:t>
+            </a:r>
+            <a:r>
+              <a:rPr lang="en-US" altLang="ja-JP" smtClean="0"/>
+              <a:t>) Reissue Password</a:t>
             </a:r>
             <a:endParaRPr kumimoji="1" lang="ja-JP" altLang="en-US"/>
           </a:p>
@@ -12006,7 +13556,7 @@
         </p:nvSpPr>
         <p:spPr>
           <a:xfrm>
-            <a:off x="2051720" y="511176"/>
+            <a:off x="2483768" y="1375272"/>
             <a:ext cx="3168352" cy="561306"/>
           </a:xfrm>
           <a:prstGeom prst="roundRect">
@@ -12034,7 +13584,7 @@
             <a:pPr algn="ctr"/>
             <a:r>
               <a:rPr lang="en-US" altLang="ja-JP" smtClean="0"/>
-              <a:t>(8) Create</a:t>
+              <a:t>(5) Create</a:t>
             </a:r>
           </a:p>
           <a:p>
@@ -12054,8 +13604,8 @@
         </p:nvSpPr>
         <p:spPr>
           <a:xfrm>
-            <a:off x="1172755" y="4061186"/>
-            <a:ext cx="1247631" cy="432048"/>
+            <a:off x="1148263" y="4385786"/>
+            <a:ext cx="1311013" cy="432048"/>
           </a:xfrm>
           <a:prstGeom prst="roundRect">
             <a:avLst/>
@@ -12082,7 +13632,7 @@
             <a:pPr algn="ctr"/>
             <a:r>
               <a:rPr lang="en-US" altLang="ja-JP" smtClean="0"/>
-              <a:t>(6) Unlock</a:t>
+              <a:t>(11) Unlock</a:t>
             </a:r>
             <a:endParaRPr kumimoji="1" lang="ja-JP" altLang="en-US"/>
           </a:p>
@@ -12096,8 +13646,8 @@
         </p:nvSpPr>
         <p:spPr>
           <a:xfrm>
-            <a:off x="3270230" y="4061186"/>
-            <a:ext cx="2160240" cy="432048"/>
+            <a:off x="3290685" y="4385786"/>
+            <a:ext cx="2305755" cy="432048"/>
           </a:xfrm>
           <a:prstGeom prst="roundRect">
             <a:avLst/>
@@ -12124,7 +13674,7 @@
             <a:pPr algn="ctr"/>
             <a:r>
               <a:rPr lang="en-US" altLang="ja-JP" smtClean="0"/>
-              <a:t>(4) Change Password</a:t>
+              <a:t>(13) Change Password</a:t>
             </a:r>
             <a:endParaRPr kumimoji="1" lang="ja-JP" altLang="en-US"/>
           </a:p>
@@ -12138,8 +13688,8 @@
         </p:nvSpPr>
         <p:spPr>
           <a:xfrm>
-            <a:off x="2846566" y="3155726"/>
-            <a:ext cx="3015952" cy="432048"/>
+            <a:off x="2846566" y="3573016"/>
+            <a:ext cx="3189352" cy="432048"/>
           </a:xfrm>
           <a:prstGeom prst="roundRect">
             <a:avLst/>
@@ -12166,7 +13716,7 @@
             <a:pPr algn="ctr"/>
             <a:r>
               <a:rPr lang="en-US" altLang="ja-JP" smtClean="0"/>
-              <a:t>(3) Show Account Information</a:t>
+              <a:t>(10) Show Account Information</a:t>
             </a:r>
             <a:endParaRPr kumimoji="1" lang="ja-JP" altLang="en-US"/>
           </a:p>
@@ -12180,7 +13730,7 @@
         </p:nvSpPr>
         <p:spPr>
           <a:xfrm>
-            <a:off x="5652120" y="1484784"/>
+            <a:off x="5868144" y="2365480"/>
             <a:ext cx="2808312" cy="544706"/>
           </a:xfrm>
           <a:prstGeom prst="roundRect">
@@ -12208,7 +13758,7 @@
             <a:pPr algn="ctr"/>
             <a:r>
               <a:rPr lang="en-US" altLang="ja-JP" smtClean="0"/>
-              <a:t>(11) Reissue Password (Complete)</a:t>
+              <a:t>(8) Reissue Password (Complete)</a:t>
             </a:r>
             <a:endParaRPr kumimoji="1" lang="ja-JP" altLang="en-US"/>
           </a:p>
@@ -12222,8 +13772,8 @@
         </p:nvSpPr>
         <p:spPr>
           <a:xfrm>
-            <a:off x="5652120" y="332656"/>
-            <a:ext cx="3168352" cy="921346"/>
+            <a:off x="5868144" y="1196752"/>
+            <a:ext cx="3073352" cy="921346"/>
           </a:xfrm>
           <a:prstGeom prst="roundRect">
             <a:avLst/>
@@ -12250,7 +13800,7 @@
             <a:pPr algn="ctr"/>
             <a:r>
               <a:rPr lang="en-US" altLang="ja-JP" smtClean="0"/>
-              <a:t>(9) Create</a:t>
+              <a:t>(6) Create</a:t>
             </a:r>
           </a:p>
           <a:p>
@@ -12277,8 +13827,8 @@
         </p:nvSpPr>
         <p:spPr>
           <a:xfrm>
-            <a:off x="6084168" y="3875806"/>
-            <a:ext cx="2232248" cy="812770"/>
+            <a:off x="6035918" y="4200406"/>
+            <a:ext cx="2352506" cy="812770"/>
           </a:xfrm>
           <a:prstGeom prst="roundRect">
             <a:avLst/>
@@ -12305,7 +13855,7 @@
             <a:pPr algn="ctr"/>
             <a:r>
               <a:rPr lang="en-US" altLang="ja-JP" smtClean="0"/>
-              <a:t>(5) Change Password</a:t>
+              <a:t>(14) Change Password</a:t>
             </a:r>
           </a:p>
           <a:p>
@@ -12329,8 +13879,8 @@
         </p:nvCxnSpPr>
         <p:spPr>
           <a:xfrm>
-            <a:off x="5220072" y="791829"/>
-            <a:ext cx="432048" cy="1500"/>
+            <a:off x="5652120" y="1655925"/>
+            <a:ext cx="216024" cy="1500"/>
           </a:xfrm>
           <a:prstGeom prst="straightConnector1">
             <a:avLst/>
@@ -12365,8 +13915,8 @@
         </p:nvCxnSpPr>
         <p:spPr>
           <a:xfrm>
-            <a:off x="5220072" y="1755564"/>
-            <a:ext cx="432048" cy="1573"/>
+            <a:off x="5652120" y="2636260"/>
+            <a:ext cx="216024" cy="1573"/>
           </a:xfrm>
           <a:prstGeom prst="straightConnector1">
             <a:avLst/>
@@ -12400,9 +13950,9 @@
           <p:nvPr/>
         </p:nvCxnSpPr>
         <p:spPr>
-          <a:xfrm flipH="1">
-            <a:off x="4350350" y="3587774"/>
-            <a:ext cx="4192" cy="473412"/>
+          <a:xfrm>
+            <a:off x="4441242" y="4005064"/>
+            <a:ext cx="2321" cy="380722"/>
           </a:xfrm>
           <a:prstGeom prst="straightConnector1">
             <a:avLst/>
@@ -12437,8 +13987,8 @@
         </p:nvCxnSpPr>
         <p:spPr>
           <a:xfrm>
-            <a:off x="5430470" y="4277210"/>
-            <a:ext cx="653698" cy="4981"/>
+            <a:off x="5596440" y="4601810"/>
+            <a:ext cx="439478" cy="4981"/>
           </a:xfrm>
           <a:prstGeom prst="straightConnector1">
             <a:avLst/>
@@ -12473,12 +14023,12 @@
         </p:nvCxnSpPr>
         <p:spPr>
           <a:xfrm rot="16200000" flipV="1">
-            <a:off x="4139952" y="815466"/>
-            <a:ext cx="720080" cy="5400600"/>
+            <a:off x="4192237" y="1180471"/>
+            <a:ext cx="627390" cy="5412479"/>
           </a:xfrm>
           <a:prstGeom prst="bentConnector3">
             <a:avLst>
-              <a:gd name="adj1" fmla="val 131746"/>
+              <a:gd name="adj1" fmla="val 127327"/>
             </a:avLst>
           </a:prstGeom>
           <a:ln>
@@ -12508,7 +14058,7 @@
         </p:nvSpPr>
         <p:spPr>
           <a:xfrm>
-            <a:off x="1068629" y="4811910"/>
+            <a:off x="1076793" y="5013176"/>
             <a:ext cx="1452643" cy="576064"/>
           </a:xfrm>
           <a:prstGeom prst="roundRect">
@@ -12536,7 +14086,7 @@
             <a:pPr algn="ctr"/>
             <a:r>
               <a:rPr lang="en-US" altLang="ja-JP" smtClean="0"/>
-              <a:t>(7) Unlock </a:t>
+              <a:t>(12) Unlock </a:t>
             </a:r>
           </a:p>
           <a:p>
@@ -12560,8 +14110,8 @@
         </p:nvCxnSpPr>
         <p:spPr>
           <a:xfrm flipH="1">
-            <a:off x="1794951" y="4493234"/>
-            <a:ext cx="1620" cy="318676"/>
+            <a:off x="1803115" y="4817834"/>
+            <a:ext cx="655" cy="195342"/>
           </a:xfrm>
           <a:prstGeom prst="straightConnector1">
             <a:avLst/>
@@ -12596,12 +14146,12 @@
         </p:nvCxnSpPr>
         <p:spPr>
           <a:xfrm rot="10800000" flipH="1">
-            <a:off x="1068628" y="3371750"/>
-            <a:ext cx="191003" cy="1728192"/>
+            <a:off x="1076792" y="3789040"/>
+            <a:ext cx="182839" cy="1512168"/>
           </a:xfrm>
           <a:prstGeom prst="bentConnector3">
             <a:avLst>
-              <a:gd name="adj1" fmla="val -119684"/>
+              <a:gd name="adj1" fmla="val -125028"/>
             </a:avLst>
           </a:prstGeom>
           <a:ln>
@@ -12634,8 +14184,8 @@
         </p:nvCxnSpPr>
         <p:spPr>
           <a:xfrm rot="16200000" flipH="1">
-            <a:off x="988477" y="953724"/>
-            <a:ext cx="766210" cy="871973"/>
+            <a:off x="1157830" y="1540366"/>
+            <a:ext cx="319493" cy="979986"/>
           </a:xfrm>
           <a:prstGeom prst="bentConnector3">
             <a:avLst>
@@ -12671,9 +14221,9 @@
           <p:nvPr/>
         </p:nvCxnSpPr>
         <p:spPr>
-          <a:xfrm flipH="1">
-            <a:off x="1796571" y="3587774"/>
-            <a:ext cx="3121" cy="473412"/>
+          <a:xfrm>
+            <a:off x="1799692" y="4005064"/>
+            <a:ext cx="4078" cy="380722"/>
           </a:xfrm>
           <a:prstGeom prst="straightConnector1">
             <a:avLst/>
@@ -12709,7 +14259,7 @@
         </p:nvCxnSpPr>
         <p:spPr>
           <a:xfrm>
-            <a:off x="2339752" y="3371750"/>
+            <a:off x="2339752" y="3789040"/>
             <a:ext cx="506814" cy="0"/>
           </a:xfrm>
           <a:prstGeom prst="straightConnector1">
@@ -12743,7 +14293,7 @@
         </p:nvSpPr>
         <p:spPr>
           <a:xfrm>
-            <a:off x="340780" y="1772816"/>
+            <a:off x="340780" y="2190106"/>
             <a:ext cx="2933577" cy="878854"/>
           </a:xfrm>
           <a:prstGeom prst="flowChartDecision">
@@ -12784,13 +14334,13 @@
         </p:nvCxnSpPr>
         <p:spPr>
           <a:xfrm rot="10800000" flipH="1" flipV="1">
-            <a:off x="340780" y="2212242"/>
-            <a:ext cx="4009570" cy="2280991"/>
+            <a:off x="340779" y="2629532"/>
+            <a:ext cx="4102783" cy="2188301"/>
           </a:xfrm>
           <a:prstGeom prst="bentConnector4">
             <a:avLst>
-              <a:gd name="adj1" fmla="val -2904"/>
-              <a:gd name="adj2" fmla="val 154270"/>
+              <a:gd name="adj1" fmla="val -5572"/>
+              <a:gd name="adj2" fmla="val 146636"/>
             </a:avLst>
           </a:prstGeom>
           <a:ln>
@@ -12823,7 +14373,7 @@
         </p:nvCxnSpPr>
         <p:spPr>
           <a:xfrm flipH="1">
-            <a:off x="1799692" y="2651670"/>
+            <a:off x="1799692" y="3068960"/>
             <a:ext cx="7877" cy="504056"/>
           </a:xfrm>
           <a:prstGeom prst="straightConnector1">
@@ -12856,8 +14406,8 @@
         </p:nvSpPr>
         <p:spPr>
           <a:xfrm>
-            <a:off x="971600" y="3875806"/>
-            <a:ext cx="1660376" cy="1656184"/>
+            <a:off x="971600" y="4200407"/>
+            <a:ext cx="1660376" cy="1460842"/>
           </a:xfrm>
           <a:prstGeom prst="rect">
             <a:avLst/>
@@ -12895,8 +14445,8 @@
         </p:nvSpPr>
         <p:spPr>
           <a:xfrm>
-            <a:off x="728912" y="1933331"/>
-            <a:ext cx="2198039" cy="646331"/>
+            <a:off x="842405" y="2383277"/>
+            <a:ext cx="1971052" cy="584775"/>
           </a:xfrm>
           <a:prstGeom prst="rect">
             <a:avLst/>
@@ -12911,18 +14461,18 @@
           <a:p>
             <a:pPr algn="ctr"/>
             <a:r>
-              <a:rPr lang="en-US" altLang="ja-JP"/>
+              <a:rPr lang="en-US" altLang="ja-JP" sz="1600"/>
               <a:t>S</a:t>
             </a:r>
             <a:r>
-              <a:rPr lang="en-US" altLang="ja-JP" smtClean="0"/>
+              <a:rPr lang="en-US" altLang="ja-JP" sz="1600" smtClean="0"/>
               <a:t>hould the password </a:t>
             </a:r>
           </a:p>
           <a:p>
             <a:pPr algn="ctr"/>
             <a:r>
-              <a:rPr lang="en-US" altLang="ja-JP" smtClean="0"/>
+              <a:rPr lang="en-US" altLang="ja-JP" sz="1600" smtClean="0"/>
               <a:t>be changed?</a:t>
             </a:r>
           </a:p>
@@ -12936,7 +14486,7 @@
         </p:nvSpPr>
         <p:spPr>
           <a:xfrm>
-            <a:off x="673667" y="6038540"/>
+            <a:off x="673667" y="6110548"/>
             <a:ext cx="752698" cy="288032"/>
           </a:xfrm>
           <a:prstGeom prst="roundRect">
@@ -12974,7 +14524,7 @@
         </p:nvSpPr>
         <p:spPr>
           <a:xfrm>
-            <a:off x="1510747" y="5977492"/>
+            <a:off x="1510747" y="6049500"/>
             <a:ext cx="631455" cy="369332"/>
           </a:xfrm>
           <a:prstGeom prst="rect">
@@ -13004,7 +14554,7 @@
         </p:nvCxnSpPr>
         <p:spPr>
           <a:xfrm>
-            <a:off x="634780" y="6614604"/>
+            <a:off x="634780" y="6686612"/>
             <a:ext cx="816220" cy="0"/>
           </a:xfrm>
           <a:prstGeom prst="straightConnector1">
@@ -13037,7 +14587,7 @@
         </p:nvSpPr>
         <p:spPr>
           <a:xfrm>
-            <a:off x="1494130" y="6372036"/>
+            <a:off x="1494130" y="6444044"/>
             <a:ext cx="1106585" cy="369332"/>
           </a:xfrm>
           <a:prstGeom prst="rect">
@@ -13067,7 +14617,7 @@
         </p:nvSpPr>
         <p:spPr>
           <a:xfrm>
-            <a:off x="2805861" y="5977493"/>
+            <a:off x="2779964" y="6049501"/>
             <a:ext cx="859541" cy="344686"/>
           </a:xfrm>
           <a:prstGeom prst="rect">
@@ -13105,8 +14655,153 @@
         </p:nvSpPr>
         <p:spPr>
           <a:xfrm>
-            <a:off x="3686248" y="5957906"/>
-            <a:ext cx="1519327" cy="369332"/>
+            <a:off x="3682990" y="6065683"/>
+            <a:ext cx="2257162" cy="338554"/>
+          </a:xfrm>
+          <a:prstGeom prst="rect">
+            <a:avLst/>
+          </a:prstGeom>
+          <a:noFill/>
+        </p:spPr>
+        <p:txBody>
+          <a:bodyPr wrap="square" rtlCol="0">
+            <a:spAutoFit/>
+          </a:bodyPr>
+          <a:lstStyle/>
+          <a:p>
+            <a:r>
+              <a:rPr kumimoji="1" lang="en-US" altLang="ja-JP" sz="1600" smtClean="0"/>
+              <a:t>Authentication </a:t>
+            </a:r>
+            <a:r>
+              <a:rPr lang="en-US" altLang="ja-JP" sz="1600" smtClean="0"/>
+              <a:t>required</a:t>
+            </a:r>
+            <a:endParaRPr kumimoji="1" lang="ja-JP" altLang="en-US" sz="1600"/>
+          </a:p>
+        </p:txBody>
+      </p:sp>
+      <p:sp>
+        <p:nvSpPr>
+          <p:cNvPr id="115" name="正方形/長方形 114"/>
+          <p:cNvSpPr/>
+          <p:nvPr/>
+        </p:nvSpPr>
+        <p:spPr>
+          <a:xfrm>
+            <a:off x="2798143" y="6479214"/>
+            <a:ext cx="865611" cy="296416"/>
+          </a:xfrm>
+          <a:prstGeom prst="rect">
+            <a:avLst/>
+          </a:prstGeom>
+          <a:noFill/>
+        </p:spPr>
+        <p:style>
+          <a:lnRef idx="2">
+            <a:schemeClr val="accent6"/>
+          </a:lnRef>
+          <a:fillRef idx="1">
+            <a:schemeClr val="lt1"/>
+          </a:fillRef>
+          <a:effectRef idx="0">
+            <a:schemeClr val="accent6"/>
+          </a:effectRef>
+          <a:fontRef idx="minor">
+            <a:schemeClr val="dk1"/>
+          </a:fontRef>
+        </p:style>
+        <p:txBody>
+          <a:bodyPr rtlCol="0" anchor="ctr"/>
+          <a:lstStyle/>
+          <a:p>
+            <a:pPr algn="ctr"/>
+            <a:endParaRPr kumimoji="1" lang="ja-JP" altLang="en-US"/>
+          </a:p>
+        </p:txBody>
+      </p:sp>
+      <p:sp>
+        <p:nvSpPr>
+          <p:cNvPr id="116" name="テキスト ボックス 115"/>
+          <p:cNvSpPr txBox="1"/>
+          <p:nvPr/>
+        </p:nvSpPr>
+        <p:spPr>
+          <a:xfrm>
+            <a:off x="3686248" y="6461500"/>
+            <a:ext cx="2073884" cy="338554"/>
+          </a:xfrm>
+          <a:prstGeom prst="rect">
+            <a:avLst/>
+          </a:prstGeom>
+          <a:noFill/>
+        </p:spPr>
+        <p:txBody>
+          <a:bodyPr wrap="square" rtlCol="0">
+            <a:spAutoFit/>
+          </a:bodyPr>
+          <a:lstStyle/>
+          <a:p>
+            <a:r>
+              <a:rPr kumimoji="1" lang="en-US" altLang="ja-JP" sz="1600" smtClean="0"/>
+              <a:t>Authorization </a:t>
+            </a:r>
+            <a:r>
+              <a:rPr lang="en-US" altLang="ja-JP" sz="1600" smtClean="0"/>
+              <a:t>required</a:t>
+            </a:r>
+            <a:endParaRPr kumimoji="1" lang="ja-JP" altLang="en-US" sz="1600"/>
+          </a:p>
+        </p:txBody>
+      </p:sp>
+      <p:sp>
+        <p:nvSpPr>
+          <p:cNvPr id="117" name="フローチャート : 判断 116"/>
+          <p:cNvSpPr/>
+          <p:nvPr/>
+        </p:nvSpPr>
+        <p:spPr>
+          <a:xfrm>
+            <a:off x="5915496" y="6093296"/>
+            <a:ext cx="1001836" cy="300891"/>
+          </a:xfrm>
+          <a:prstGeom prst="flowChartDecision">
+            <a:avLst/>
+          </a:prstGeom>
+        </p:spPr>
+        <p:style>
+          <a:lnRef idx="2">
+            <a:schemeClr val="dk1"/>
+          </a:lnRef>
+          <a:fillRef idx="1">
+            <a:schemeClr val="lt1"/>
+          </a:fillRef>
+          <a:effectRef idx="0">
+            <a:schemeClr val="dk1"/>
+          </a:effectRef>
+          <a:fontRef idx="minor">
+            <a:schemeClr val="dk1"/>
+          </a:fontRef>
+        </p:style>
+        <p:txBody>
+          <a:bodyPr rtlCol="0" anchor="ctr"/>
+          <a:lstStyle/>
+          <a:p>
+            <a:pPr algn="ctr"/>
+            <a:endParaRPr kumimoji="1" lang="ja-JP" altLang="en-US"/>
+          </a:p>
+        </p:txBody>
+      </p:sp>
+      <p:sp>
+        <p:nvSpPr>
+          <p:cNvPr id="118" name="テキスト ボックス 117"/>
+          <p:cNvSpPr txBox="1"/>
+          <p:nvPr/>
+        </p:nvSpPr>
+        <p:spPr>
+          <a:xfrm>
+            <a:off x="6923608" y="6049500"/>
+            <a:ext cx="1968872" cy="369332"/>
           </a:xfrm>
           <a:prstGeom prst="rect">
             <a:avLst/>
@@ -13121,143 +14816,6 @@
           <a:p>
             <a:r>
               <a:rPr kumimoji="1" lang="en-US" altLang="ja-JP" smtClean="0"/>
-              <a:t>Authenticated</a:t>
-            </a:r>
-            <a:endParaRPr kumimoji="1" lang="ja-JP" altLang="en-US"/>
-          </a:p>
-        </p:txBody>
-      </p:sp>
-      <p:sp>
-        <p:nvSpPr>
-          <p:cNvPr id="115" name="正方形/長方形 114"/>
-          <p:cNvSpPr/>
-          <p:nvPr/>
-        </p:nvSpPr>
-        <p:spPr>
-          <a:xfrm>
-            <a:off x="2798143" y="6407206"/>
-            <a:ext cx="865611" cy="296416"/>
-          </a:xfrm>
-          <a:prstGeom prst="rect">
-            <a:avLst/>
-          </a:prstGeom>
-          <a:noFill/>
-        </p:spPr>
-        <p:style>
-          <a:lnRef idx="2">
-            <a:schemeClr val="accent6"/>
-          </a:lnRef>
-          <a:fillRef idx="1">
-            <a:schemeClr val="lt1"/>
-          </a:fillRef>
-          <a:effectRef idx="0">
-            <a:schemeClr val="accent6"/>
-          </a:effectRef>
-          <a:fontRef idx="minor">
-            <a:schemeClr val="dk1"/>
-          </a:fontRef>
-        </p:style>
-        <p:txBody>
-          <a:bodyPr rtlCol="0" anchor="ctr"/>
-          <a:lstStyle/>
-          <a:p>
-            <a:pPr algn="ctr"/>
-            <a:endParaRPr kumimoji="1" lang="ja-JP" altLang="en-US"/>
-          </a:p>
-        </p:txBody>
-      </p:sp>
-      <p:sp>
-        <p:nvSpPr>
-          <p:cNvPr id="116" name="テキスト ボックス 115"/>
-          <p:cNvSpPr txBox="1"/>
-          <p:nvPr/>
-        </p:nvSpPr>
-        <p:spPr>
-          <a:xfrm>
-            <a:off x="3686248" y="6354784"/>
-            <a:ext cx="1216615" cy="369332"/>
-          </a:xfrm>
-          <a:prstGeom prst="rect">
-            <a:avLst/>
-          </a:prstGeom>
-          <a:noFill/>
-        </p:spPr>
-        <p:txBody>
-          <a:bodyPr wrap="none" rtlCol="0">
-            <a:spAutoFit/>
-          </a:bodyPr>
-          <a:lstStyle/>
-          <a:p>
-            <a:r>
-              <a:rPr kumimoji="1" lang="en-US" altLang="ja-JP" smtClean="0"/>
-              <a:t>Authorized</a:t>
-            </a:r>
-            <a:endParaRPr kumimoji="1" lang="ja-JP" altLang="en-US"/>
-          </a:p>
-        </p:txBody>
-      </p:sp>
-      <p:sp>
-        <p:nvSpPr>
-          <p:cNvPr id="117" name="フローチャート : 判断 116"/>
-          <p:cNvSpPr/>
-          <p:nvPr/>
-        </p:nvSpPr>
-        <p:spPr>
-          <a:xfrm>
-            <a:off x="5339432" y="6021288"/>
-            <a:ext cx="1001836" cy="300891"/>
-          </a:xfrm>
-          <a:prstGeom prst="flowChartDecision">
-            <a:avLst/>
-          </a:prstGeom>
-        </p:spPr>
-        <p:style>
-          <a:lnRef idx="2">
-            <a:schemeClr val="dk1"/>
-          </a:lnRef>
-          <a:fillRef idx="1">
-            <a:schemeClr val="lt1"/>
-          </a:fillRef>
-          <a:effectRef idx="0">
-            <a:schemeClr val="dk1"/>
-          </a:effectRef>
-          <a:fontRef idx="minor">
-            <a:schemeClr val="dk1"/>
-          </a:fontRef>
-        </p:style>
-        <p:txBody>
-          <a:bodyPr rtlCol="0" anchor="ctr"/>
-          <a:lstStyle/>
-          <a:p>
-            <a:pPr algn="ctr"/>
-            <a:endParaRPr kumimoji="1" lang="ja-JP" altLang="en-US"/>
-          </a:p>
-        </p:txBody>
-      </p:sp>
-      <p:sp>
-        <p:nvSpPr>
-          <p:cNvPr id="118" name="テキスト ボックス 117"/>
-          <p:cNvSpPr txBox="1"/>
-          <p:nvPr/>
-        </p:nvSpPr>
-        <p:spPr>
-          <a:xfrm>
-            <a:off x="6347544" y="5977492"/>
-            <a:ext cx="1968872" cy="369332"/>
-          </a:xfrm>
-          <a:prstGeom prst="rect">
-            <a:avLst/>
-          </a:prstGeom>
-          <a:noFill/>
-        </p:spPr>
-        <p:txBody>
-          <a:bodyPr wrap="none" rtlCol="0">
-            <a:spAutoFit/>
-          </a:bodyPr>
-          <a:lstStyle/>
-          <a:p>
-            <a:r>
-              <a:rPr kumimoji="1" lang="en-US" altLang="ja-JP" smtClean="0"/>
               <a:t>Conditional Branch</a:t>
             </a:r>
             <a:endParaRPr kumimoji="1" lang="ja-JP" altLang="en-US"/>
@@ -13272,8 +14830,8 @@
         </p:nvSpPr>
         <p:spPr>
           <a:xfrm>
-            <a:off x="514896" y="5877272"/>
-            <a:ext cx="7801520" cy="864096"/>
+            <a:off x="514896" y="5949280"/>
+            <a:ext cx="8426600" cy="864096"/>
           </a:xfrm>
           <a:prstGeom prst="rect">
             <a:avLst/>
@@ -13314,7 +14872,7 @@
         </p:nvSpPr>
         <p:spPr>
           <a:xfrm>
-            <a:off x="179512" y="1844824"/>
+            <a:off x="114200" y="2297706"/>
             <a:ext cx="449717" cy="369332"/>
           </a:xfrm>
           <a:prstGeom prst="rect">
@@ -13344,7 +14902,7 @@
         </p:nvSpPr>
         <p:spPr>
           <a:xfrm>
-            <a:off x="1475656" y="2564904"/>
+            <a:off x="1505503" y="3013280"/>
             <a:ext cx="449717" cy="369332"/>
           </a:xfrm>
           <a:prstGeom prst="rect">
@@ -13377,8 +14935,8 @@
         </p:nvCxnSpPr>
         <p:spPr>
           <a:xfrm>
-            <a:off x="1475656" y="790582"/>
-            <a:ext cx="576064" cy="1247"/>
+            <a:off x="1367643" y="1654589"/>
+            <a:ext cx="1116125" cy="1336"/>
           </a:xfrm>
           <a:prstGeom prst="straightConnector1">
             <a:avLst/>
@@ -13413,16 +14971,327 @@
         </p:nvCxnSpPr>
         <p:spPr>
           <a:xfrm flipH="1" flipV="1">
-            <a:off x="935596" y="574558"/>
-            <a:ext cx="7524836" cy="1182579"/>
+            <a:off x="827583" y="1438565"/>
+            <a:ext cx="7848873" cy="1199268"/>
           </a:xfrm>
           <a:prstGeom prst="bentConnector4">
             <a:avLst>
-              <a:gd name="adj1" fmla="val -6706"/>
-              <a:gd name="adj2" fmla="val 132461"/>
+              <a:gd name="adj1" fmla="val -4889"/>
+              <a:gd name="adj2" fmla="val 208243"/>
             </a:avLst>
           </a:prstGeom>
           <a:ln>
+            <a:tailEnd type="arrow"/>
+          </a:ln>
+        </p:spPr>
+        <p:style>
+          <a:lnRef idx="2">
+            <a:schemeClr val="dk1"/>
+          </a:lnRef>
+          <a:fillRef idx="0">
+            <a:schemeClr val="dk1"/>
+          </a:fillRef>
+          <a:effectRef idx="1">
+            <a:schemeClr val="dk1"/>
+          </a:effectRef>
+          <a:fontRef idx="minor">
+            <a:schemeClr val="tx1"/>
+          </a:fontRef>
+        </p:style>
+      </p:cxnSp>
+      <p:sp>
+        <p:nvSpPr>
+          <p:cNvPr id="48" name="角丸四角形 47"/>
+          <p:cNvSpPr/>
+          <p:nvPr/>
+        </p:nvSpPr>
+        <p:spPr>
+          <a:xfrm>
+            <a:off x="1187624" y="411258"/>
+            <a:ext cx="1656184" cy="561306"/>
+          </a:xfrm>
+          <a:prstGeom prst="roundRect">
+            <a:avLst/>
+          </a:prstGeom>
+        </p:spPr>
+        <p:style>
+          <a:lnRef idx="1">
+            <a:schemeClr val="accent1"/>
+          </a:lnRef>
+          <a:fillRef idx="2">
+            <a:schemeClr val="accent1"/>
+          </a:fillRef>
+          <a:effectRef idx="1">
+            <a:schemeClr val="accent1"/>
+          </a:effectRef>
+          <a:fontRef idx="minor">
+            <a:schemeClr val="dk1"/>
+          </a:fontRef>
+        </p:style>
+        <p:txBody>
+          <a:bodyPr rtlCol="0" anchor="ctr"/>
+          <a:lstStyle/>
+          <a:p>
+            <a:pPr algn="ctr"/>
+            <a:r>
+              <a:rPr lang="en-US" altLang="ja-JP" smtClean="0"/>
+              <a:t>(2) Create</a:t>
+            </a:r>
+          </a:p>
+          <a:p>
+            <a:pPr algn="ctr"/>
+            <a:r>
+              <a:rPr lang="en-US" altLang="ja-JP" smtClean="0"/>
+              <a:t>New Account</a:t>
+            </a:r>
+          </a:p>
+        </p:txBody>
+      </p:sp>
+      <p:sp>
+        <p:nvSpPr>
+          <p:cNvPr id="49" name="角丸四角形 48"/>
+          <p:cNvSpPr/>
+          <p:nvPr/>
+        </p:nvSpPr>
+        <p:spPr>
+          <a:xfrm>
+            <a:off x="3202348" y="411258"/>
+            <a:ext cx="2737804" cy="561306"/>
+          </a:xfrm>
+          <a:prstGeom prst="roundRect">
+            <a:avLst/>
+          </a:prstGeom>
+        </p:spPr>
+        <p:style>
+          <a:lnRef idx="1">
+            <a:schemeClr val="accent1"/>
+          </a:lnRef>
+          <a:fillRef idx="2">
+            <a:schemeClr val="accent1"/>
+          </a:fillRef>
+          <a:effectRef idx="1">
+            <a:schemeClr val="accent1"/>
+          </a:effectRef>
+          <a:fontRef idx="minor">
+            <a:schemeClr val="dk1"/>
+          </a:fontRef>
+        </p:style>
+        <p:txBody>
+          <a:bodyPr rtlCol="0" anchor="ctr"/>
+          <a:lstStyle/>
+          <a:p>
+            <a:pPr algn="ctr"/>
+            <a:r>
+              <a:rPr lang="en-US" altLang="ja-JP" smtClean="0"/>
+              <a:t>(3) Create</a:t>
+            </a:r>
+            <a:r>
+              <a:rPr lang="en-US" altLang="ja-JP"/>
+              <a:t> </a:t>
+            </a:r>
+            <a:r>
+              <a:rPr lang="en-US" altLang="ja-JP" smtClean="0"/>
+              <a:t>New Account</a:t>
+            </a:r>
+          </a:p>
+          <a:p>
+            <a:pPr algn="ctr"/>
+            <a:r>
+              <a:rPr lang="en-US" altLang="ja-JP" smtClean="0"/>
+              <a:t>(Confirm)</a:t>
+            </a:r>
+          </a:p>
+        </p:txBody>
+      </p:sp>
+      <p:sp>
+        <p:nvSpPr>
+          <p:cNvPr id="51" name="角丸四角形 50"/>
+          <p:cNvSpPr/>
+          <p:nvPr/>
+        </p:nvSpPr>
+        <p:spPr>
+          <a:xfrm>
+            <a:off x="6131684" y="412828"/>
+            <a:ext cx="2737804" cy="561306"/>
+          </a:xfrm>
+          <a:prstGeom prst="roundRect">
+            <a:avLst/>
+          </a:prstGeom>
+        </p:spPr>
+        <p:style>
+          <a:lnRef idx="1">
+            <a:schemeClr val="accent1"/>
+          </a:lnRef>
+          <a:fillRef idx="2">
+            <a:schemeClr val="accent1"/>
+          </a:fillRef>
+          <a:effectRef idx="1">
+            <a:schemeClr val="accent1"/>
+          </a:effectRef>
+          <a:fontRef idx="minor">
+            <a:schemeClr val="dk1"/>
+          </a:fontRef>
+        </p:style>
+        <p:txBody>
+          <a:bodyPr rtlCol="0" anchor="ctr"/>
+          <a:lstStyle/>
+          <a:p>
+            <a:pPr algn="ctr"/>
+            <a:r>
+              <a:rPr lang="en-US" altLang="ja-JP" smtClean="0"/>
+              <a:t>(4) Create</a:t>
+            </a:r>
+            <a:r>
+              <a:rPr lang="en-US" altLang="ja-JP"/>
+              <a:t> </a:t>
+            </a:r>
+            <a:r>
+              <a:rPr lang="en-US" altLang="ja-JP" smtClean="0"/>
+              <a:t>New Account</a:t>
+            </a:r>
+          </a:p>
+          <a:p>
+            <a:pPr algn="ctr"/>
+            <a:r>
+              <a:rPr lang="en-US" altLang="ja-JP" smtClean="0"/>
+              <a:t>(Complete)</a:t>
+            </a:r>
+          </a:p>
+        </p:txBody>
+      </p:sp>
+      <p:cxnSp>
+        <p:nvCxnSpPr>
+          <p:cNvPr id="72" name="カギ線コネクタ 71"/>
+          <p:cNvCxnSpPr>
+            <a:stCxn id="4" idx="3"/>
+            <a:endCxn id="48" idx="1"/>
+          </p:cNvCxnSpPr>
+          <p:nvPr/>
+        </p:nvCxnSpPr>
+        <p:spPr>
+          <a:xfrm flipH="1" flipV="1">
+            <a:off x="1187624" y="691911"/>
+            <a:ext cx="180019" cy="962678"/>
+          </a:xfrm>
+          <a:prstGeom prst="bentConnector5">
+            <a:avLst>
+              <a:gd name="adj1" fmla="val -126987"/>
+              <a:gd name="adj2" fmla="val 46643"/>
+              <a:gd name="adj3" fmla="val 226987"/>
+            </a:avLst>
+          </a:prstGeom>
+          <a:ln>
+            <a:tailEnd type="arrow"/>
+          </a:ln>
+        </p:spPr>
+        <p:style>
+          <a:lnRef idx="2">
+            <a:schemeClr val="dk1"/>
+          </a:lnRef>
+          <a:fillRef idx="0">
+            <a:schemeClr val="dk1"/>
+          </a:fillRef>
+          <a:effectRef idx="1">
+            <a:schemeClr val="dk1"/>
+          </a:effectRef>
+          <a:fontRef idx="minor">
+            <a:schemeClr val="tx1"/>
+          </a:fontRef>
+        </p:style>
+      </p:cxnSp>
+      <p:cxnSp>
+        <p:nvCxnSpPr>
+          <p:cNvPr id="78" name="直線矢印コネクタ 77"/>
+          <p:cNvCxnSpPr>
+            <a:stCxn id="49" idx="3"/>
+            <a:endCxn id="51" idx="1"/>
+          </p:cNvCxnSpPr>
+          <p:nvPr/>
+        </p:nvCxnSpPr>
+        <p:spPr>
+          <a:xfrm>
+            <a:off x="5940152" y="691911"/>
+            <a:ext cx="191532" cy="1570"/>
+          </a:xfrm>
+          <a:prstGeom prst="straightConnector1">
+            <a:avLst/>
+          </a:prstGeom>
+          <a:ln>
+            <a:tailEnd type="arrow"/>
+          </a:ln>
+        </p:spPr>
+        <p:style>
+          <a:lnRef idx="2">
+            <a:schemeClr val="dk1"/>
+          </a:lnRef>
+          <a:fillRef idx="0">
+            <a:schemeClr val="dk1"/>
+          </a:fillRef>
+          <a:effectRef idx="1">
+            <a:schemeClr val="dk1"/>
+          </a:effectRef>
+          <a:fontRef idx="minor">
+            <a:schemeClr val="tx1"/>
+          </a:fontRef>
+        </p:style>
+      </p:cxnSp>
+      <p:cxnSp>
+        <p:nvCxnSpPr>
+          <p:cNvPr id="81" name="カギ線コネクタ 80"/>
+          <p:cNvCxnSpPr>
+            <a:stCxn id="51" idx="0"/>
+            <a:endCxn id="4" idx="0"/>
+          </p:cNvCxnSpPr>
+          <p:nvPr/>
+        </p:nvCxnSpPr>
+        <p:spPr>
+          <a:xfrm rot="16200000" flipH="1" flipV="1">
+            <a:off x="3651216" y="-2410806"/>
+            <a:ext cx="1025737" cy="6673003"/>
+          </a:xfrm>
+          <a:prstGeom prst="bentConnector3">
+            <a:avLst>
+              <a:gd name="adj1" fmla="val -27858"/>
+            </a:avLst>
+          </a:prstGeom>
+          <a:ln>
+            <a:tailEnd type="arrow"/>
+          </a:ln>
+        </p:spPr>
+        <p:style>
+          <a:lnRef idx="2">
+            <a:schemeClr val="dk1"/>
+          </a:lnRef>
+          <a:fillRef idx="0">
+            <a:schemeClr val="dk1"/>
+          </a:fillRef>
+          <a:effectRef idx="1">
+            <a:schemeClr val="dk1"/>
+          </a:effectRef>
+          <a:fontRef idx="minor">
+            <a:schemeClr val="tx1"/>
+          </a:fontRef>
+        </p:style>
+      </p:cxnSp>
+      <p:cxnSp>
+        <p:nvCxnSpPr>
+          <p:cNvPr id="52" name="直線矢印コネクタ 51"/>
+          <p:cNvCxnSpPr>
+            <a:stCxn id="48" idx="3"/>
+            <a:endCxn id="49" idx="1"/>
+          </p:cNvCxnSpPr>
+          <p:nvPr/>
+        </p:nvCxnSpPr>
+        <p:spPr>
+          <a:xfrm>
+            <a:off x="2843808" y="691911"/>
+            <a:ext cx="358540" cy="0"/>
+          </a:xfrm>
+          <a:prstGeom prst="straightConnector1">
+            <a:avLst/>
+          </a:prstGeom>
+          <a:ln>
+            <a:headEnd type="arrow"/>
             <a:tailEnd type="arrow"/>
           </a:ln>
         </p:spPr>

</xml_diff>